<commit_message>
update power point persentasi
</commit_message>
<xml_diff>
--- a/Presentation TA.pptx
+++ b/Presentation TA.pptx
@@ -4,6 +4,9 @@
   <p:sldMasterIdLst>
     <p:sldMasterId id="2147483720" r:id="rId1"/>
   </p:sldMasterIdLst>
+  <p:notesMasterIdLst>
+    <p:notesMasterId r:id="rId31"/>
+  </p:notesMasterIdLst>
   <p:sldIdLst>
     <p:sldId id="256" r:id="rId2"/>
     <p:sldId id="283" r:id="rId3"/>
@@ -28,11 +31,12 @@
     <p:sldId id="278" r:id="rId22"/>
     <p:sldId id="279" r:id="rId23"/>
     <p:sldId id="266" r:id="rId24"/>
-    <p:sldId id="268" r:id="rId25"/>
-    <p:sldId id="269" r:id="rId26"/>
-    <p:sldId id="280" r:id="rId27"/>
-    <p:sldId id="281" r:id="rId28"/>
-    <p:sldId id="270" r:id="rId29"/>
+    <p:sldId id="285" r:id="rId25"/>
+    <p:sldId id="268" r:id="rId26"/>
+    <p:sldId id="269" r:id="rId27"/>
+    <p:sldId id="280" r:id="rId28"/>
+    <p:sldId id="281" r:id="rId29"/>
+    <p:sldId id="270" r:id="rId30"/>
   </p:sldIdLst>
   <p:sldSz cx="9144000" cy="6858000" type="screen4x3"/>
   <p:notesSz cx="6858000" cy="9144000"/>
@@ -159,6 +163,7 @@
             <p14:sldId id="278"/>
             <p14:sldId id="279"/>
             <p14:sldId id="266"/>
+            <p14:sldId id="285"/>
             <p14:sldId id="268"/>
             <p14:sldId id="269"/>
             <p14:sldId id="280"/>
@@ -184,6 +189,440 @@
     </p:ext>
   </p:extLst>
 </p:presentation>
+</file>
+
+<file path=ppt/notesMasters/notesMaster1.xml><?xml version="1.0" encoding="utf-8"?>
+<p:notesMaster xmlns:a="http://schemas.openxmlformats.org/drawingml/2006/main" xmlns:r="http://schemas.openxmlformats.org/officeDocument/2006/relationships" xmlns:p="http://schemas.openxmlformats.org/presentationml/2006/main">
+  <p:cSld>
+    <p:bg>
+      <p:bgRef idx="1001">
+        <a:schemeClr val="bg1"/>
+      </p:bgRef>
+    </p:bg>
+    <p:spTree>
+      <p:nvGrpSpPr>
+        <p:cNvPr id="1" name=""/>
+        <p:cNvGrpSpPr/>
+        <p:nvPr/>
+      </p:nvGrpSpPr>
+      <p:grpSpPr>
+        <a:xfrm>
+          <a:off x="0" y="0"/>
+          <a:ext cx="0" cy="0"/>
+          <a:chOff x="0" y="0"/>
+          <a:chExt cx="0" cy="0"/>
+        </a:xfrm>
+      </p:grpSpPr>
+      <p:sp>
+        <p:nvSpPr>
+          <p:cNvPr id="2" name="Header Placeholder 1"/>
+          <p:cNvSpPr>
+            <a:spLocks noGrp="1"/>
+          </p:cNvSpPr>
+          <p:nvPr>
+            <p:ph type="hdr" sz="quarter"/>
+          </p:nvPr>
+        </p:nvSpPr>
+        <p:spPr>
+          <a:xfrm>
+            <a:off x="0" y="0"/>
+            <a:ext cx="2971800" cy="458788"/>
+          </a:xfrm>
+          <a:prstGeom prst="rect">
+            <a:avLst/>
+          </a:prstGeom>
+        </p:spPr>
+        <p:txBody>
+          <a:bodyPr vert="horz" lIns="91440" tIns="45720" rIns="91440" bIns="45720" rtlCol="0"/>
+          <a:lstStyle>
+            <a:lvl1pPr algn="l">
+              <a:defRPr sz="1200"/>
+            </a:lvl1pPr>
+          </a:lstStyle>
+          <a:p>
+            <a:endParaRPr lang="en-ID"/>
+          </a:p>
+        </p:txBody>
+      </p:sp>
+      <p:sp>
+        <p:nvSpPr>
+          <p:cNvPr id="3" name="Date Placeholder 2"/>
+          <p:cNvSpPr>
+            <a:spLocks noGrp="1"/>
+          </p:cNvSpPr>
+          <p:nvPr>
+            <p:ph type="dt" idx="1"/>
+          </p:nvPr>
+        </p:nvSpPr>
+        <p:spPr>
+          <a:xfrm>
+            <a:off x="3884613" y="0"/>
+            <a:ext cx="2971800" cy="458788"/>
+          </a:xfrm>
+          <a:prstGeom prst="rect">
+            <a:avLst/>
+          </a:prstGeom>
+        </p:spPr>
+        <p:txBody>
+          <a:bodyPr vert="horz" lIns="91440" tIns="45720" rIns="91440" bIns="45720" rtlCol="0"/>
+          <a:lstStyle>
+            <a:lvl1pPr algn="r">
+              <a:defRPr sz="1200"/>
+            </a:lvl1pPr>
+          </a:lstStyle>
+          <a:p>
+            <a:fld id="{C9A9459A-73FD-4618-8D50-BE417A3DC833}" type="datetimeFigureOut">
+              <a:rPr lang="en-ID" smtClean="0"/>
+              <a:t>06/12/2019</a:t>
+            </a:fld>
+            <a:endParaRPr lang="en-ID"/>
+          </a:p>
+        </p:txBody>
+      </p:sp>
+      <p:sp>
+        <p:nvSpPr>
+          <p:cNvPr id="4" name="Slide Image Placeholder 3"/>
+          <p:cNvSpPr>
+            <a:spLocks noGrp="1" noRot="1" noChangeAspect="1"/>
+          </p:cNvSpPr>
+          <p:nvPr>
+            <p:ph type="sldImg" idx="2"/>
+          </p:nvPr>
+        </p:nvSpPr>
+        <p:spPr>
+          <a:xfrm>
+            <a:off x="1371600" y="1143000"/>
+            <a:ext cx="4114800" cy="3086100"/>
+          </a:xfrm>
+          <a:prstGeom prst="rect">
+            <a:avLst/>
+          </a:prstGeom>
+          <a:noFill/>
+          <a:ln w="12700">
+            <a:solidFill>
+              <a:prstClr val="black"/>
+            </a:solidFill>
+          </a:ln>
+        </p:spPr>
+        <p:txBody>
+          <a:bodyPr vert="horz" lIns="91440" tIns="45720" rIns="91440" bIns="45720" rtlCol="0" anchor="ctr"/>
+          <a:lstStyle/>
+          <a:p>
+            <a:endParaRPr lang="en-ID"/>
+          </a:p>
+        </p:txBody>
+      </p:sp>
+      <p:sp>
+        <p:nvSpPr>
+          <p:cNvPr id="5" name="Notes Placeholder 4"/>
+          <p:cNvSpPr>
+            <a:spLocks noGrp="1"/>
+          </p:cNvSpPr>
+          <p:nvPr>
+            <p:ph type="body" sz="quarter" idx="3"/>
+          </p:nvPr>
+        </p:nvSpPr>
+        <p:spPr>
+          <a:xfrm>
+            <a:off x="685800" y="4400550"/>
+            <a:ext cx="5486400" cy="3600450"/>
+          </a:xfrm>
+          <a:prstGeom prst="rect">
+            <a:avLst/>
+          </a:prstGeom>
+        </p:spPr>
+        <p:txBody>
+          <a:bodyPr vert="horz" lIns="91440" tIns="45720" rIns="91440" bIns="45720" rtlCol="0"/>
+          <a:lstStyle/>
+          <a:p>
+            <a:pPr lvl="0"/>
+            <a:r>
+              <a:rPr lang="en-US"/>
+              <a:t>Click to edit Master text styles</a:t>
+            </a:r>
+          </a:p>
+          <a:p>
+            <a:pPr lvl="1"/>
+            <a:r>
+              <a:rPr lang="en-US"/>
+              <a:t>Second level</a:t>
+            </a:r>
+          </a:p>
+          <a:p>
+            <a:pPr lvl="2"/>
+            <a:r>
+              <a:rPr lang="en-US"/>
+              <a:t>Third level</a:t>
+            </a:r>
+          </a:p>
+          <a:p>
+            <a:pPr lvl="3"/>
+            <a:r>
+              <a:rPr lang="en-US"/>
+              <a:t>Fourth level</a:t>
+            </a:r>
+          </a:p>
+          <a:p>
+            <a:pPr lvl="4"/>
+            <a:r>
+              <a:rPr lang="en-US"/>
+              <a:t>Fifth level</a:t>
+            </a:r>
+            <a:endParaRPr lang="en-ID"/>
+          </a:p>
+        </p:txBody>
+      </p:sp>
+      <p:sp>
+        <p:nvSpPr>
+          <p:cNvPr id="6" name="Footer Placeholder 5"/>
+          <p:cNvSpPr>
+            <a:spLocks noGrp="1"/>
+          </p:cNvSpPr>
+          <p:nvPr>
+            <p:ph type="ftr" sz="quarter" idx="4"/>
+          </p:nvPr>
+        </p:nvSpPr>
+        <p:spPr>
+          <a:xfrm>
+            <a:off x="0" y="8685213"/>
+            <a:ext cx="2971800" cy="458787"/>
+          </a:xfrm>
+          <a:prstGeom prst="rect">
+            <a:avLst/>
+          </a:prstGeom>
+        </p:spPr>
+        <p:txBody>
+          <a:bodyPr vert="horz" lIns="91440" tIns="45720" rIns="91440" bIns="45720" rtlCol="0" anchor="b"/>
+          <a:lstStyle>
+            <a:lvl1pPr algn="l">
+              <a:defRPr sz="1200"/>
+            </a:lvl1pPr>
+          </a:lstStyle>
+          <a:p>
+            <a:endParaRPr lang="en-ID"/>
+          </a:p>
+        </p:txBody>
+      </p:sp>
+      <p:sp>
+        <p:nvSpPr>
+          <p:cNvPr id="7" name="Slide Number Placeholder 6"/>
+          <p:cNvSpPr>
+            <a:spLocks noGrp="1"/>
+          </p:cNvSpPr>
+          <p:nvPr>
+            <p:ph type="sldNum" sz="quarter" idx="5"/>
+          </p:nvPr>
+        </p:nvSpPr>
+        <p:spPr>
+          <a:xfrm>
+            <a:off x="3884613" y="8685213"/>
+            <a:ext cx="2971800" cy="458787"/>
+          </a:xfrm>
+          <a:prstGeom prst="rect">
+            <a:avLst/>
+          </a:prstGeom>
+        </p:spPr>
+        <p:txBody>
+          <a:bodyPr vert="horz" lIns="91440" tIns="45720" rIns="91440" bIns="45720" rtlCol="0" anchor="b"/>
+          <a:lstStyle>
+            <a:lvl1pPr algn="r">
+              <a:defRPr sz="1200"/>
+            </a:lvl1pPr>
+          </a:lstStyle>
+          <a:p>
+            <a:fld id="{8083A4A7-B37F-4393-98DF-EDCCF53A7B52}" type="slidenum">
+              <a:rPr lang="en-ID" smtClean="0"/>
+              <a:t>‹#›</a:t>
+            </a:fld>
+            <a:endParaRPr lang="en-ID"/>
+          </a:p>
+        </p:txBody>
+      </p:sp>
+    </p:spTree>
+    <p:extLst>
+      <p:ext uri="{BB962C8B-B14F-4D97-AF65-F5344CB8AC3E}">
+        <p14:creationId xmlns:p14="http://schemas.microsoft.com/office/powerpoint/2010/main" val="612494659"/>
+      </p:ext>
+    </p:extLst>
+  </p:cSld>
+  <p:clrMap bg1="lt1" tx1="dk1" bg2="lt2" tx2="dk2" accent1="accent1" accent2="accent2" accent3="accent3" accent4="accent4" accent5="accent5" accent6="accent6" hlink="hlink" folHlink="folHlink"/>
+  <p:notesStyle>
+    <a:lvl1pPr marL="0" algn="l" defTabSz="914400" rtl="0" eaLnBrk="1" latinLnBrk="0" hangingPunct="1">
+      <a:defRPr sz="1200" kern="1200">
+        <a:solidFill>
+          <a:schemeClr val="tx1"/>
+        </a:solidFill>
+        <a:latin typeface="+mn-lt"/>
+        <a:ea typeface="+mn-ea"/>
+        <a:cs typeface="+mn-cs"/>
+      </a:defRPr>
+    </a:lvl1pPr>
+    <a:lvl2pPr marL="457200" algn="l" defTabSz="914400" rtl="0" eaLnBrk="1" latinLnBrk="0" hangingPunct="1">
+      <a:defRPr sz="1200" kern="1200">
+        <a:solidFill>
+          <a:schemeClr val="tx1"/>
+        </a:solidFill>
+        <a:latin typeface="+mn-lt"/>
+        <a:ea typeface="+mn-ea"/>
+        <a:cs typeface="+mn-cs"/>
+      </a:defRPr>
+    </a:lvl2pPr>
+    <a:lvl3pPr marL="914400" algn="l" defTabSz="914400" rtl="0" eaLnBrk="1" latinLnBrk="0" hangingPunct="1">
+      <a:defRPr sz="1200" kern="1200">
+        <a:solidFill>
+          <a:schemeClr val="tx1"/>
+        </a:solidFill>
+        <a:latin typeface="+mn-lt"/>
+        <a:ea typeface="+mn-ea"/>
+        <a:cs typeface="+mn-cs"/>
+      </a:defRPr>
+    </a:lvl3pPr>
+    <a:lvl4pPr marL="1371600" algn="l" defTabSz="914400" rtl="0" eaLnBrk="1" latinLnBrk="0" hangingPunct="1">
+      <a:defRPr sz="1200" kern="1200">
+        <a:solidFill>
+          <a:schemeClr val="tx1"/>
+        </a:solidFill>
+        <a:latin typeface="+mn-lt"/>
+        <a:ea typeface="+mn-ea"/>
+        <a:cs typeface="+mn-cs"/>
+      </a:defRPr>
+    </a:lvl4pPr>
+    <a:lvl5pPr marL="1828800" algn="l" defTabSz="914400" rtl="0" eaLnBrk="1" latinLnBrk="0" hangingPunct="1">
+      <a:defRPr sz="1200" kern="1200">
+        <a:solidFill>
+          <a:schemeClr val="tx1"/>
+        </a:solidFill>
+        <a:latin typeface="+mn-lt"/>
+        <a:ea typeface="+mn-ea"/>
+        <a:cs typeface="+mn-cs"/>
+      </a:defRPr>
+    </a:lvl5pPr>
+    <a:lvl6pPr marL="2286000" algn="l" defTabSz="914400" rtl="0" eaLnBrk="1" latinLnBrk="0" hangingPunct="1">
+      <a:defRPr sz="1200" kern="1200">
+        <a:solidFill>
+          <a:schemeClr val="tx1"/>
+        </a:solidFill>
+        <a:latin typeface="+mn-lt"/>
+        <a:ea typeface="+mn-ea"/>
+        <a:cs typeface="+mn-cs"/>
+      </a:defRPr>
+    </a:lvl6pPr>
+    <a:lvl7pPr marL="2743200" algn="l" defTabSz="914400" rtl="0" eaLnBrk="1" latinLnBrk="0" hangingPunct="1">
+      <a:defRPr sz="1200" kern="1200">
+        <a:solidFill>
+          <a:schemeClr val="tx1"/>
+        </a:solidFill>
+        <a:latin typeface="+mn-lt"/>
+        <a:ea typeface="+mn-ea"/>
+        <a:cs typeface="+mn-cs"/>
+      </a:defRPr>
+    </a:lvl7pPr>
+    <a:lvl8pPr marL="3200400" algn="l" defTabSz="914400" rtl="0" eaLnBrk="1" latinLnBrk="0" hangingPunct="1">
+      <a:defRPr sz="1200" kern="1200">
+        <a:solidFill>
+          <a:schemeClr val="tx1"/>
+        </a:solidFill>
+        <a:latin typeface="+mn-lt"/>
+        <a:ea typeface="+mn-ea"/>
+        <a:cs typeface="+mn-cs"/>
+      </a:defRPr>
+    </a:lvl8pPr>
+    <a:lvl9pPr marL="3657600" algn="l" defTabSz="914400" rtl="0" eaLnBrk="1" latinLnBrk="0" hangingPunct="1">
+      <a:defRPr sz="1200" kern="1200">
+        <a:solidFill>
+          <a:schemeClr val="tx1"/>
+        </a:solidFill>
+        <a:latin typeface="+mn-lt"/>
+        <a:ea typeface="+mn-ea"/>
+        <a:cs typeface="+mn-cs"/>
+      </a:defRPr>
+    </a:lvl9pPr>
+  </p:notesStyle>
+</p:notesMaster>
+</file>
+
+<file path=ppt/notesSlides/notesSlide1.xml><?xml version="1.0" encoding="utf-8"?>
+<p:notes xmlns:a="http://schemas.openxmlformats.org/drawingml/2006/main" xmlns:r="http://schemas.openxmlformats.org/officeDocument/2006/relationships" xmlns:p="http://schemas.openxmlformats.org/presentationml/2006/main">
+  <p:cSld>
+    <p:spTree>
+      <p:nvGrpSpPr>
+        <p:cNvPr id="1" name=""/>
+        <p:cNvGrpSpPr/>
+        <p:nvPr/>
+      </p:nvGrpSpPr>
+      <p:grpSpPr>
+        <a:xfrm>
+          <a:off x="0" y="0"/>
+          <a:ext cx="0" cy="0"/>
+          <a:chOff x="0" y="0"/>
+          <a:chExt cx="0" cy="0"/>
+        </a:xfrm>
+      </p:grpSpPr>
+      <p:sp>
+        <p:nvSpPr>
+          <p:cNvPr id="2" name="Slide Image Placeholder 1"/>
+          <p:cNvSpPr>
+            <a:spLocks noGrp="1" noRot="1" noChangeAspect="1"/>
+          </p:cNvSpPr>
+          <p:nvPr>
+            <p:ph type="sldImg"/>
+          </p:nvPr>
+        </p:nvSpPr>
+        <p:spPr/>
+      </p:sp>
+      <p:sp>
+        <p:nvSpPr>
+          <p:cNvPr id="3" name="Notes Placeholder 2"/>
+          <p:cNvSpPr>
+            <a:spLocks noGrp="1"/>
+          </p:cNvSpPr>
+          <p:nvPr>
+            <p:ph type="body" idx="1"/>
+          </p:nvPr>
+        </p:nvSpPr>
+        <p:spPr/>
+        <p:txBody>
+          <a:bodyPr/>
+          <a:lstStyle/>
+          <a:p>
+            <a:endParaRPr lang="en-ID" dirty="0"/>
+          </a:p>
+        </p:txBody>
+      </p:sp>
+      <p:sp>
+        <p:nvSpPr>
+          <p:cNvPr id="4" name="Slide Number Placeholder 3"/>
+          <p:cNvSpPr>
+            <a:spLocks noGrp="1"/>
+          </p:cNvSpPr>
+          <p:nvPr>
+            <p:ph type="sldNum" sz="quarter" idx="5"/>
+          </p:nvPr>
+        </p:nvSpPr>
+        <p:spPr/>
+        <p:txBody>
+          <a:bodyPr/>
+          <a:lstStyle/>
+          <a:p>
+            <a:fld id="{8083A4A7-B37F-4393-98DF-EDCCF53A7B52}" type="slidenum">
+              <a:rPr lang="en-ID" smtClean="0"/>
+              <a:t>24</a:t>
+            </a:fld>
+            <a:endParaRPr lang="en-ID"/>
+          </a:p>
+        </p:txBody>
+      </p:sp>
+    </p:spTree>
+    <p:extLst>
+      <p:ext uri="{BB962C8B-B14F-4D97-AF65-F5344CB8AC3E}">
+        <p14:creationId xmlns:p14="http://schemas.microsoft.com/office/powerpoint/2010/main" val="1963089112"/>
+      </p:ext>
+    </p:extLst>
+  </p:cSld>
+  <p:clrMapOvr>
+    <a:masterClrMapping/>
+  </p:clrMapOvr>
+</p:notes>
 </file>
 
 <file path=ppt/slideLayouts/slideLayout1.xml><?xml version="1.0" encoding="utf-8"?>
@@ -10276,6 +10715,707 @@
     <p:bg>
       <p:bgPr>
         <a:blipFill dpi="0" rotWithShape="1">
+          <a:blip r:embed="rId3">
+            <a:lum/>
+          </a:blip>
+          <a:srcRect/>
+          <a:stretch>
+            <a:fillRect/>
+          </a:stretch>
+        </a:blipFill>
+        <a:effectLst/>
+      </p:bgPr>
+    </p:bg>
+    <p:spTree>
+      <p:nvGrpSpPr>
+        <p:cNvPr id="1" name=""/>
+        <p:cNvGrpSpPr/>
+        <p:nvPr/>
+      </p:nvGrpSpPr>
+      <p:grpSpPr>
+        <a:xfrm>
+          <a:off x="0" y="0"/>
+          <a:ext cx="0" cy="0"/>
+          <a:chOff x="0" y="0"/>
+          <a:chExt cx="0" cy="0"/>
+        </a:xfrm>
+      </p:grpSpPr>
+      <p:sp>
+        <p:nvSpPr>
+          <p:cNvPr id="2" name="Title 1">
+            <a:extLst>
+              <a:ext uri="{FF2B5EF4-FFF2-40B4-BE49-F238E27FC236}">
+                <a16:creationId xmlns:a16="http://schemas.microsoft.com/office/drawing/2014/main" id="{A304A63C-2AB2-43E2-81C7-98E9A901DFBA}"/>
+              </a:ext>
+            </a:extLst>
+          </p:cNvPr>
+          <p:cNvSpPr>
+            <a:spLocks noGrp="1"/>
+          </p:cNvSpPr>
+          <p:nvPr>
+            <p:ph type="title"/>
+          </p:nvPr>
+        </p:nvSpPr>
+        <p:spPr>
+          <a:xfrm>
+            <a:off x="762000" y="0"/>
+            <a:ext cx="7543800" cy="1143000"/>
+          </a:xfrm>
+        </p:spPr>
+        <p:txBody>
+          <a:bodyPr/>
+          <a:lstStyle/>
+          <a:p>
+            <a:pPr algn="ctr"/>
+            <a:r>
+              <a:rPr lang="en-US" dirty="0" err="1">
+                <a:solidFill>
+                  <a:schemeClr val="tx1"/>
+                </a:solidFill>
+              </a:rPr>
+              <a:t>Perhitungan</a:t>
+            </a:r>
+            <a:r>
+              <a:rPr lang="en-US" dirty="0">
+                <a:solidFill>
+                  <a:schemeClr val="tx1"/>
+                </a:solidFill>
+              </a:rPr>
+              <a:t> naïve </a:t>
+            </a:r>
+            <a:r>
+              <a:rPr lang="en-US" dirty="0" err="1">
+                <a:solidFill>
+                  <a:schemeClr val="tx1"/>
+                </a:solidFill>
+              </a:rPr>
+              <a:t>bayes</a:t>
+            </a:r>
+            <a:endParaRPr lang="en-US" dirty="0">
+              <a:solidFill>
+                <a:schemeClr val="tx1"/>
+              </a:solidFill>
+            </a:endParaRPr>
+          </a:p>
+        </p:txBody>
+      </p:sp>
+      <p:pic>
+        <p:nvPicPr>
+          <p:cNvPr id="8" name="Content Placeholder 7">
+            <a:extLst>
+              <a:ext uri="{FF2B5EF4-FFF2-40B4-BE49-F238E27FC236}">
+                <a16:creationId xmlns:a16="http://schemas.microsoft.com/office/drawing/2014/main" id="{5841FB6D-811E-4CEF-8638-C906CEC91EB7}"/>
+              </a:ext>
+            </a:extLst>
+          </p:cNvPr>
+          <p:cNvPicPr>
+            <a:picLocks noGrp="1" noChangeAspect="1"/>
+          </p:cNvPicPr>
+          <p:nvPr>
+            <p:ph sz="quarter" idx="2"/>
+          </p:nvPr>
+        </p:nvPicPr>
+        <p:blipFill>
+          <a:blip r:embed="rId4"/>
+          <a:stretch>
+            <a:fillRect/>
+          </a:stretch>
+        </p:blipFill>
+        <p:spPr>
+          <a:xfrm>
+            <a:off x="683568" y="1680477"/>
+            <a:ext cx="8064896" cy="1316475"/>
+          </a:xfrm>
+          <a:prstGeom prst="rect">
+            <a:avLst/>
+          </a:prstGeom>
+        </p:spPr>
+      </p:pic>
+      <p:sp>
+        <p:nvSpPr>
+          <p:cNvPr id="20" name="Content Placeholder 2">
+            <a:extLst>
+              <a:ext uri="{FF2B5EF4-FFF2-40B4-BE49-F238E27FC236}">
+                <a16:creationId xmlns:a16="http://schemas.microsoft.com/office/drawing/2014/main" id="{CC6C5797-F162-41B1-B4B2-1171E8D14DF2}"/>
+              </a:ext>
+            </a:extLst>
+          </p:cNvPr>
+          <p:cNvSpPr txBox="1">
+            <a:spLocks/>
+          </p:cNvSpPr>
+          <p:nvPr/>
+        </p:nvSpPr>
+        <p:spPr>
+          <a:xfrm>
+            <a:off x="548072" y="3536184"/>
+            <a:ext cx="8290050" cy="3205184"/>
+          </a:xfrm>
+          <a:prstGeom prst="rect">
+            <a:avLst/>
+          </a:prstGeom>
+        </p:spPr>
+        <p:txBody>
+          <a:bodyPr vert="horz">
+            <a:normAutofit/>
+          </a:bodyPr>
+          <a:lstStyle>
+            <a:lvl1pPr marL="274320" indent="-274320" algn="l" rtl="0" eaLnBrk="1" latinLnBrk="0" hangingPunct="1">
+              <a:spcBef>
+                <a:spcPts val="600"/>
+              </a:spcBef>
+              <a:buClr>
+                <a:schemeClr val="accent1"/>
+              </a:buClr>
+              <a:buSzPct val="70000"/>
+              <a:buFont typeface="Wingdings"/>
+              <a:buChar char=""/>
+              <a:defRPr kumimoji="0" sz="2400" kern="1200">
+                <a:solidFill>
+                  <a:schemeClr val="tx1"/>
+                </a:solidFill>
+                <a:latin typeface="+mn-lt"/>
+                <a:ea typeface="+mn-ea"/>
+                <a:cs typeface="+mn-cs"/>
+              </a:defRPr>
+            </a:lvl1pPr>
+            <a:lvl2pPr marL="640080" indent="-274320" algn="l" rtl="0" eaLnBrk="1" latinLnBrk="0" hangingPunct="1">
+              <a:spcBef>
+                <a:spcPct val="20000"/>
+              </a:spcBef>
+              <a:buClr>
+                <a:schemeClr val="accent1"/>
+              </a:buClr>
+              <a:buSzPct val="80000"/>
+              <a:buFont typeface="Wingdings 2"/>
+              <a:buChar char=""/>
+              <a:defRPr kumimoji="0" sz="2100" kern="1200">
+                <a:solidFill>
+                  <a:schemeClr val="tx1"/>
+                </a:solidFill>
+                <a:latin typeface="+mn-lt"/>
+                <a:ea typeface="+mn-ea"/>
+                <a:cs typeface="+mn-cs"/>
+              </a:defRPr>
+            </a:lvl2pPr>
+            <a:lvl3pPr marL="914400" indent="-182880" algn="l" rtl="0" eaLnBrk="1" latinLnBrk="0" hangingPunct="1">
+              <a:spcBef>
+                <a:spcPct val="20000"/>
+              </a:spcBef>
+              <a:buClr>
+                <a:schemeClr val="accent1">
+                  <a:shade val="75000"/>
+                </a:schemeClr>
+              </a:buClr>
+              <a:buSzPct val="60000"/>
+              <a:buFont typeface="Wingdings"/>
+              <a:buChar char=""/>
+              <a:defRPr kumimoji="0" sz="1800" kern="1200">
+                <a:solidFill>
+                  <a:schemeClr val="tx1"/>
+                </a:solidFill>
+                <a:latin typeface="+mn-lt"/>
+                <a:ea typeface="+mn-ea"/>
+                <a:cs typeface="+mn-cs"/>
+              </a:defRPr>
+            </a:lvl3pPr>
+            <a:lvl4pPr marL="1188720" indent="-182880" algn="l" rtl="0" eaLnBrk="1" latinLnBrk="0" hangingPunct="1">
+              <a:spcBef>
+                <a:spcPct val="20000"/>
+              </a:spcBef>
+              <a:buClr>
+                <a:schemeClr val="accent1">
+                  <a:tint val="60000"/>
+                </a:schemeClr>
+              </a:buClr>
+              <a:buSzPct val="60000"/>
+              <a:buFont typeface="Wingdings"/>
+              <a:buChar char=""/>
+              <a:defRPr kumimoji="0" sz="1800" kern="1200">
+                <a:solidFill>
+                  <a:schemeClr val="tx1"/>
+                </a:solidFill>
+                <a:latin typeface="+mn-lt"/>
+                <a:ea typeface="+mn-ea"/>
+                <a:cs typeface="+mn-cs"/>
+              </a:defRPr>
+            </a:lvl4pPr>
+            <a:lvl5pPr marL="1463040" indent="-182880" algn="l" rtl="0" eaLnBrk="1" latinLnBrk="0" hangingPunct="1">
+              <a:spcBef>
+                <a:spcPct val="20000"/>
+              </a:spcBef>
+              <a:buClr>
+                <a:schemeClr val="accent2">
+                  <a:tint val="60000"/>
+                </a:schemeClr>
+              </a:buClr>
+              <a:buSzPct val="68000"/>
+              <a:buFont typeface="Wingdings 2"/>
+              <a:buChar char=""/>
+              <a:defRPr kumimoji="0" sz="1600" kern="1200">
+                <a:solidFill>
+                  <a:schemeClr val="tx1"/>
+                </a:solidFill>
+                <a:latin typeface="+mn-lt"/>
+                <a:ea typeface="+mn-ea"/>
+                <a:cs typeface="+mn-cs"/>
+              </a:defRPr>
+            </a:lvl5pPr>
+            <a:lvl6pPr marL="1737360" indent="-182880" algn="l" rtl="0" eaLnBrk="1" latinLnBrk="0" hangingPunct="1">
+              <a:spcBef>
+                <a:spcPct val="20000"/>
+              </a:spcBef>
+              <a:buClr>
+                <a:schemeClr val="accent1"/>
+              </a:buClr>
+              <a:buChar char="•"/>
+              <a:defRPr kumimoji="0" sz="1600" kern="1200">
+                <a:solidFill>
+                  <a:schemeClr val="tx2"/>
+                </a:solidFill>
+                <a:latin typeface="+mn-lt"/>
+                <a:ea typeface="+mn-ea"/>
+                <a:cs typeface="+mn-cs"/>
+              </a:defRPr>
+            </a:lvl6pPr>
+            <a:lvl7pPr marL="2011680" indent="-182880" algn="l" rtl="0" eaLnBrk="1" latinLnBrk="0" hangingPunct="1">
+              <a:spcBef>
+                <a:spcPct val="20000"/>
+              </a:spcBef>
+              <a:buClr>
+                <a:schemeClr val="accent1">
+                  <a:tint val="60000"/>
+                </a:schemeClr>
+              </a:buClr>
+              <a:buSzPct val="60000"/>
+              <a:buFont typeface="Wingdings"/>
+              <a:buChar char=""/>
+              <a:defRPr kumimoji="0" sz="1400" kern="1200" baseline="0">
+                <a:solidFill>
+                  <a:schemeClr val="tx2"/>
+                </a:solidFill>
+                <a:latin typeface="+mn-lt"/>
+                <a:ea typeface="+mn-ea"/>
+                <a:cs typeface="+mn-cs"/>
+              </a:defRPr>
+            </a:lvl7pPr>
+            <a:lvl8pPr marL="2286000" indent="-182880" algn="l" rtl="0" eaLnBrk="1" latinLnBrk="0" hangingPunct="1">
+              <a:spcBef>
+                <a:spcPct val="20000"/>
+              </a:spcBef>
+              <a:buClr>
+                <a:schemeClr val="accent2"/>
+              </a:buClr>
+              <a:buChar char="•"/>
+              <a:defRPr kumimoji="0" sz="1400" kern="1200" cap="small" baseline="0">
+                <a:solidFill>
+                  <a:schemeClr val="tx2"/>
+                </a:solidFill>
+                <a:latin typeface="+mn-lt"/>
+                <a:ea typeface="+mn-ea"/>
+                <a:cs typeface="+mn-cs"/>
+              </a:defRPr>
+            </a:lvl8pPr>
+            <a:lvl9pPr marL="2560320" indent="-182880" algn="l" rtl="0" eaLnBrk="1" latinLnBrk="0" hangingPunct="1">
+              <a:spcBef>
+                <a:spcPct val="20000"/>
+              </a:spcBef>
+              <a:buClr>
+                <a:schemeClr val="accent1">
+                  <a:shade val="75000"/>
+                </a:schemeClr>
+              </a:buClr>
+              <a:buChar char="•"/>
+              <a:defRPr kumimoji="0" sz="1400" kern="1200" baseline="0">
+                <a:solidFill>
+                  <a:schemeClr val="tx2"/>
+                </a:solidFill>
+                <a:latin typeface="+mn-lt"/>
+                <a:ea typeface="+mn-ea"/>
+                <a:cs typeface="+mn-cs"/>
+              </a:defRPr>
+            </a:lvl9pPr>
+          </a:lstStyle>
+          <a:p>
+            <a:pPr lvl="0" algn="just"/>
+            <a:r>
+              <a:rPr lang="en-US" sz="2200" dirty="0">
+                <a:latin typeface="Times New Roman" panose="02020603050405020304" pitchFamily="18" charset="0"/>
+                <a:cs typeface="Times New Roman" panose="02020603050405020304" pitchFamily="18" charset="0"/>
+              </a:rPr>
+              <a:t>X	     = Data </a:t>
+            </a:r>
+            <a:r>
+              <a:rPr lang="en-US" sz="2200" dirty="0" err="1">
+                <a:latin typeface="Times New Roman" panose="02020603050405020304" pitchFamily="18" charset="0"/>
+                <a:cs typeface="Times New Roman" panose="02020603050405020304" pitchFamily="18" charset="0"/>
+              </a:rPr>
+              <a:t>dari</a:t>
+            </a:r>
+            <a:r>
+              <a:rPr lang="en-US" sz="2200" dirty="0">
+                <a:latin typeface="Times New Roman" panose="02020603050405020304" pitchFamily="18" charset="0"/>
+                <a:cs typeface="Times New Roman" panose="02020603050405020304" pitchFamily="18" charset="0"/>
+              </a:rPr>
+              <a:t> class </a:t>
+            </a:r>
+            <a:r>
+              <a:rPr lang="en-US" sz="2200" dirty="0" err="1">
+                <a:latin typeface="Times New Roman" panose="02020603050405020304" pitchFamily="18" charset="0"/>
+                <a:cs typeface="Times New Roman" panose="02020603050405020304" pitchFamily="18" charset="0"/>
+              </a:rPr>
+              <a:t>yg</a:t>
+            </a:r>
+            <a:r>
+              <a:rPr lang="en-US" sz="2200" dirty="0">
+                <a:latin typeface="Times New Roman" panose="02020603050405020304" pitchFamily="18" charset="0"/>
+                <a:cs typeface="Times New Roman" panose="02020603050405020304" pitchFamily="18" charset="0"/>
+              </a:rPr>
+              <a:t> </a:t>
+            </a:r>
+            <a:r>
+              <a:rPr lang="en-US" sz="2200" dirty="0" err="1">
+                <a:latin typeface="Times New Roman" panose="02020603050405020304" pitchFamily="18" charset="0"/>
+                <a:cs typeface="Times New Roman" panose="02020603050405020304" pitchFamily="18" charset="0"/>
+              </a:rPr>
+              <a:t>belum</a:t>
+            </a:r>
+            <a:r>
+              <a:rPr lang="en-US" sz="2200" dirty="0">
+                <a:latin typeface="Times New Roman" panose="02020603050405020304" pitchFamily="18" charset="0"/>
+                <a:cs typeface="Times New Roman" panose="02020603050405020304" pitchFamily="18" charset="0"/>
+              </a:rPr>
+              <a:t> di </a:t>
+            </a:r>
+            <a:r>
+              <a:rPr lang="en-US" sz="2200" dirty="0" err="1">
+                <a:latin typeface="Times New Roman" panose="02020603050405020304" pitchFamily="18" charset="0"/>
+                <a:cs typeface="Times New Roman" panose="02020603050405020304" pitchFamily="18" charset="0"/>
+              </a:rPr>
+              <a:t>ketahui</a:t>
+            </a:r>
+            <a:endParaRPr lang="en-US" sz="2200" dirty="0">
+              <a:latin typeface="Times New Roman" panose="02020603050405020304" pitchFamily="18" charset="0"/>
+              <a:cs typeface="Times New Roman" panose="02020603050405020304" pitchFamily="18" charset="0"/>
+            </a:endParaRPr>
+          </a:p>
+          <a:p>
+            <a:pPr algn="just"/>
+            <a:r>
+              <a:rPr lang="en-US" sz="2200" dirty="0">
+                <a:latin typeface="Times New Roman" panose="02020603050405020304" pitchFamily="18" charset="0"/>
+                <a:cs typeface="Times New Roman" panose="02020603050405020304" pitchFamily="18" charset="0"/>
+              </a:rPr>
+              <a:t>H	     = </a:t>
+            </a:r>
+            <a:r>
+              <a:rPr lang="en-US" sz="2200" dirty="0" err="1">
+                <a:latin typeface="Times New Roman" panose="02020603050405020304" pitchFamily="18" charset="0"/>
+                <a:cs typeface="Times New Roman" panose="02020603050405020304" pitchFamily="18" charset="0"/>
+              </a:rPr>
+              <a:t>Hipotesis</a:t>
+            </a:r>
+            <a:r>
+              <a:rPr lang="en-US" sz="2200" dirty="0">
+                <a:latin typeface="Times New Roman" panose="02020603050405020304" pitchFamily="18" charset="0"/>
+                <a:cs typeface="Times New Roman" panose="02020603050405020304" pitchFamily="18" charset="0"/>
+              </a:rPr>
+              <a:t> data x </a:t>
+            </a:r>
+            <a:r>
+              <a:rPr lang="en-US" sz="2200" dirty="0" err="1">
+                <a:latin typeface="Times New Roman" panose="02020603050405020304" pitchFamily="18" charset="0"/>
+                <a:cs typeface="Times New Roman" panose="02020603050405020304" pitchFamily="18" charset="0"/>
+              </a:rPr>
+              <a:t>yg</a:t>
+            </a:r>
+            <a:r>
+              <a:rPr lang="en-US" sz="2200" dirty="0">
+                <a:latin typeface="Times New Roman" panose="02020603050405020304" pitchFamily="18" charset="0"/>
+                <a:cs typeface="Times New Roman" panose="02020603050405020304" pitchFamily="18" charset="0"/>
+              </a:rPr>
+              <a:t> </a:t>
+            </a:r>
+            <a:r>
+              <a:rPr lang="en-US" sz="2200" dirty="0" err="1">
+                <a:latin typeface="Times New Roman" panose="02020603050405020304" pitchFamily="18" charset="0"/>
+                <a:cs typeface="Times New Roman" panose="02020603050405020304" pitchFamily="18" charset="0"/>
+              </a:rPr>
+              <a:t>merupakan</a:t>
+            </a:r>
+            <a:r>
+              <a:rPr lang="en-US" sz="2200" dirty="0">
+                <a:latin typeface="Times New Roman" panose="02020603050405020304" pitchFamily="18" charset="0"/>
+                <a:cs typeface="Times New Roman" panose="02020603050405020304" pitchFamily="18" charset="0"/>
+              </a:rPr>
+              <a:t> </a:t>
+            </a:r>
+            <a:r>
+              <a:rPr lang="en-US" sz="2200" dirty="0" err="1">
+                <a:latin typeface="Times New Roman" panose="02020603050405020304" pitchFamily="18" charset="0"/>
+                <a:cs typeface="Times New Roman" panose="02020603050405020304" pitchFamily="18" charset="0"/>
+              </a:rPr>
+              <a:t>suatu</a:t>
+            </a:r>
+            <a:r>
+              <a:rPr lang="en-US" sz="2200" dirty="0">
+                <a:latin typeface="Times New Roman" panose="02020603050405020304" pitchFamily="18" charset="0"/>
+                <a:cs typeface="Times New Roman" panose="02020603050405020304" pitchFamily="18" charset="0"/>
+              </a:rPr>
+              <a:t> class </a:t>
+            </a:r>
+            <a:r>
+              <a:rPr lang="en-US" sz="2200" dirty="0" err="1">
+                <a:latin typeface="Times New Roman" panose="02020603050405020304" pitchFamily="18" charset="0"/>
+                <a:cs typeface="Times New Roman" panose="02020603050405020304" pitchFamily="18" charset="0"/>
+              </a:rPr>
+              <a:t>yg</a:t>
+            </a:r>
+            <a:r>
+              <a:rPr lang="en-US" sz="2200" dirty="0">
+                <a:latin typeface="Times New Roman" panose="02020603050405020304" pitchFamily="18" charset="0"/>
+                <a:cs typeface="Times New Roman" panose="02020603050405020304" pitchFamily="18" charset="0"/>
+              </a:rPr>
+              <a:t>    </a:t>
+            </a:r>
+            <a:r>
+              <a:rPr lang="en-US" sz="2200" dirty="0" err="1">
+                <a:latin typeface="Times New Roman" panose="02020603050405020304" pitchFamily="18" charset="0"/>
+                <a:cs typeface="Times New Roman" panose="02020603050405020304" pitchFamily="18" charset="0"/>
+              </a:rPr>
+              <a:t>spesifik</a:t>
+            </a:r>
+            <a:endParaRPr lang="en-US" sz="2200" dirty="0">
+              <a:latin typeface="Times New Roman" panose="02020603050405020304" pitchFamily="18" charset="0"/>
+              <a:cs typeface="Times New Roman" panose="02020603050405020304" pitchFamily="18" charset="0"/>
+            </a:endParaRPr>
+          </a:p>
+          <a:p>
+            <a:pPr algn="just"/>
+            <a:r>
+              <a:rPr lang="en-US" sz="2200" dirty="0">
+                <a:latin typeface="Times New Roman" panose="02020603050405020304" pitchFamily="18" charset="0"/>
+                <a:cs typeface="Times New Roman" panose="02020603050405020304" pitchFamily="18" charset="0"/>
+              </a:rPr>
+              <a:t>P(H|X    = </a:t>
+            </a:r>
+            <a:r>
+              <a:rPr lang="en-US" sz="2200" dirty="0" err="1">
+                <a:latin typeface="Times New Roman" panose="02020603050405020304" pitchFamily="18" charset="0"/>
+                <a:cs typeface="Times New Roman" panose="02020603050405020304" pitchFamily="18" charset="0"/>
+              </a:rPr>
+              <a:t>Probabilitas</a:t>
+            </a:r>
+            <a:r>
+              <a:rPr lang="en-US" sz="2200" dirty="0">
+                <a:latin typeface="Times New Roman" panose="02020603050405020304" pitchFamily="18" charset="0"/>
+                <a:cs typeface="Times New Roman" panose="02020603050405020304" pitchFamily="18" charset="0"/>
+              </a:rPr>
+              <a:t> </a:t>
+            </a:r>
+            <a:r>
+              <a:rPr lang="en-US" sz="2200" dirty="0" err="1">
+                <a:latin typeface="Times New Roman" panose="02020603050405020304" pitchFamily="18" charset="0"/>
+                <a:cs typeface="Times New Roman" panose="02020603050405020304" pitchFamily="18" charset="0"/>
+              </a:rPr>
+              <a:t>hipotesis</a:t>
+            </a:r>
+            <a:r>
+              <a:rPr lang="en-US" sz="2200" dirty="0">
+                <a:latin typeface="Times New Roman" panose="02020603050405020304" pitchFamily="18" charset="0"/>
+                <a:cs typeface="Times New Roman" panose="02020603050405020304" pitchFamily="18" charset="0"/>
+              </a:rPr>
+              <a:t> H </a:t>
+            </a:r>
+            <a:r>
+              <a:rPr lang="en-US" sz="2200" dirty="0" err="1">
+                <a:latin typeface="Times New Roman" panose="02020603050405020304" pitchFamily="18" charset="0"/>
+                <a:cs typeface="Times New Roman" panose="02020603050405020304" pitchFamily="18" charset="0"/>
+              </a:rPr>
+              <a:t>berdasarkan</a:t>
+            </a:r>
+            <a:r>
+              <a:rPr lang="en-US" sz="2200" dirty="0">
+                <a:latin typeface="Times New Roman" panose="02020603050405020304" pitchFamily="18" charset="0"/>
+                <a:cs typeface="Times New Roman" panose="02020603050405020304" pitchFamily="18" charset="0"/>
+              </a:rPr>
+              <a:t> </a:t>
+            </a:r>
+            <a:r>
+              <a:rPr lang="en-US" sz="2200" dirty="0" err="1">
+                <a:latin typeface="Times New Roman" panose="02020603050405020304" pitchFamily="18" charset="0"/>
+                <a:cs typeface="Times New Roman" panose="02020603050405020304" pitchFamily="18" charset="0"/>
+              </a:rPr>
+              <a:t>kondisi</a:t>
+            </a:r>
+            <a:r>
+              <a:rPr lang="en-US" sz="2200" dirty="0">
+                <a:latin typeface="Times New Roman" panose="02020603050405020304" pitchFamily="18" charset="0"/>
+                <a:cs typeface="Times New Roman" panose="02020603050405020304" pitchFamily="18" charset="0"/>
+              </a:rPr>
+              <a:t> X</a:t>
+            </a:r>
+          </a:p>
+          <a:p>
+            <a:pPr algn="just"/>
+            <a:r>
+              <a:rPr lang="en-US" sz="2200" dirty="0">
+                <a:latin typeface="Times New Roman" panose="02020603050405020304" pitchFamily="18" charset="0"/>
+                <a:cs typeface="Times New Roman" panose="02020603050405020304" pitchFamily="18" charset="0"/>
+              </a:rPr>
+              <a:t>P(H)	     = </a:t>
+            </a:r>
+            <a:r>
+              <a:rPr lang="en-US" sz="2200" dirty="0" err="1">
+                <a:latin typeface="Times New Roman" panose="02020603050405020304" pitchFamily="18" charset="0"/>
+                <a:cs typeface="Times New Roman" panose="02020603050405020304" pitchFamily="18" charset="0"/>
+              </a:rPr>
+              <a:t>Probabilitas</a:t>
+            </a:r>
+            <a:r>
+              <a:rPr lang="en-US" sz="2200" dirty="0">
+                <a:latin typeface="Times New Roman" panose="02020603050405020304" pitchFamily="18" charset="0"/>
+                <a:cs typeface="Times New Roman" panose="02020603050405020304" pitchFamily="18" charset="0"/>
+              </a:rPr>
+              <a:t> </a:t>
+            </a:r>
+            <a:r>
+              <a:rPr lang="en-US" sz="2200" dirty="0" err="1">
+                <a:latin typeface="Times New Roman" panose="02020603050405020304" pitchFamily="18" charset="0"/>
+                <a:cs typeface="Times New Roman" panose="02020603050405020304" pitchFamily="18" charset="0"/>
+              </a:rPr>
+              <a:t>hipotesis</a:t>
+            </a:r>
+            <a:r>
+              <a:rPr lang="en-US" sz="2200" dirty="0">
+                <a:latin typeface="Times New Roman" panose="02020603050405020304" pitchFamily="18" charset="0"/>
+                <a:cs typeface="Times New Roman" panose="02020603050405020304" pitchFamily="18" charset="0"/>
+              </a:rPr>
+              <a:t> H</a:t>
+            </a:r>
+          </a:p>
+          <a:p>
+            <a:pPr algn="just"/>
+            <a:r>
+              <a:rPr lang="en-US" sz="2200" dirty="0">
+                <a:latin typeface="Times New Roman" panose="02020603050405020304" pitchFamily="18" charset="0"/>
+                <a:cs typeface="Times New Roman" panose="02020603050405020304" pitchFamily="18" charset="0"/>
+              </a:rPr>
+              <a:t>P(X|H    = </a:t>
+            </a:r>
+            <a:r>
+              <a:rPr lang="en-US" sz="2200" dirty="0" err="1">
+                <a:latin typeface="Times New Roman" panose="02020603050405020304" pitchFamily="18" charset="0"/>
+                <a:cs typeface="Times New Roman" panose="02020603050405020304" pitchFamily="18" charset="0"/>
+              </a:rPr>
+              <a:t>Probabilitas</a:t>
+            </a:r>
+            <a:r>
+              <a:rPr lang="en-US" sz="2200" dirty="0">
+                <a:latin typeface="Times New Roman" panose="02020603050405020304" pitchFamily="18" charset="0"/>
+                <a:cs typeface="Times New Roman" panose="02020603050405020304" pitchFamily="18" charset="0"/>
+              </a:rPr>
+              <a:t> </a:t>
+            </a:r>
+            <a:r>
+              <a:rPr lang="en-US" sz="2200" dirty="0" err="1">
+                <a:latin typeface="Times New Roman" panose="02020603050405020304" pitchFamily="18" charset="0"/>
+                <a:cs typeface="Times New Roman" panose="02020603050405020304" pitchFamily="18" charset="0"/>
+              </a:rPr>
+              <a:t>hipotesis</a:t>
+            </a:r>
+            <a:r>
+              <a:rPr lang="en-US" sz="2200" dirty="0">
+                <a:latin typeface="Times New Roman" panose="02020603050405020304" pitchFamily="18" charset="0"/>
+                <a:cs typeface="Times New Roman" panose="02020603050405020304" pitchFamily="18" charset="0"/>
+              </a:rPr>
+              <a:t> X </a:t>
+            </a:r>
+            <a:r>
+              <a:rPr lang="en-US" sz="2200" dirty="0" err="1">
+                <a:latin typeface="Times New Roman" panose="02020603050405020304" pitchFamily="18" charset="0"/>
+                <a:cs typeface="Times New Roman" panose="02020603050405020304" pitchFamily="18" charset="0"/>
+              </a:rPr>
+              <a:t>berdasarkan</a:t>
+            </a:r>
+            <a:r>
+              <a:rPr lang="en-US" sz="2200" dirty="0">
+                <a:latin typeface="Times New Roman" panose="02020603050405020304" pitchFamily="18" charset="0"/>
+                <a:cs typeface="Times New Roman" panose="02020603050405020304" pitchFamily="18" charset="0"/>
+              </a:rPr>
+              <a:t> </a:t>
+            </a:r>
+            <a:r>
+              <a:rPr lang="en-US" sz="2200" dirty="0" err="1">
+                <a:latin typeface="Times New Roman" panose="02020603050405020304" pitchFamily="18" charset="0"/>
+                <a:cs typeface="Times New Roman" panose="02020603050405020304" pitchFamily="18" charset="0"/>
+              </a:rPr>
+              <a:t>kondisi</a:t>
+            </a:r>
+            <a:r>
+              <a:rPr lang="en-US" sz="2200" dirty="0">
+                <a:latin typeface="Times New Roman" panose="02020603050405020304" pitchFamily="18" charset="0"/>
+                <a:cs typeface="Times New Roman" panose="02020603050405020304" pitchFamily="18" charset="0"/>
+              </a:rPr>
+              <a:t> H</a:t>
+            </a:r>
+          </a:p>
+          <a:p>
+            <a:pPr algn="just"/>
+            <a:r>
+              <a:rPr lang="en-US" sz="2200" dirty="0">
+                <a:latin typeface="Times New Roman" panose="02020603050405020304" pitchFamily="18" charset="0"/>
+                <a:cs typeface="Times New Roman" panose="02020603050405020304" pitchFamily="18" charset="0"/>
+              </a:rPr>
+              <a:t>P(X)      = </a:t>
+            </a:r>
+            <a:r>
+              <a:rPr lang="en-US" sz="2200" dirty="0" err="1">
+                <a:latin typeface="Times New Roman" panose="02020603050405020304" pitchFamily="18" charset="0"/>
+                <a:cs typeface="Times New Roman" panose="02020603050405020304" pitchFamily="18" charset="0"/>
+              </a:rPr>
+              <a:t>Probabilitas</a:t>
+            </a:r>
+            <a:r>
+              <a:rPr lang="en-US" sz="2200" dirty="0">
+                <a:latin typeface="Times New Roman" panose="02020603050405020304" pitchFamily="18" charset="0"/>
+                <a:cs typeface="Times New Roman" panose="02020603050405020304" pitchFamily="18" charset="0"/>
+              </a:rPr>
+              <a:t> X</a:t>
+            </a:r>
+          </a:p>
+        </p:txBody>
+      </p:sp>
+    </p:spTree>
+    <p:extLst>
+      <p:ext uri="{BB962C8B-B14F-4D97-AF65-F5344CB8AC3E}">
+        <p14:creationId xmlns:p14="http://schemas.microsoft.com/office/powerpoint/2010/main" val="1447694835"/>
+      </p:ext>
+    </p:extLst>
+  </p:cSld>
+  <p:clrMapOvr>
+    <a:masterClrMapping/>
+  </p:clrMapOvr>
+  <mc:AlternateContent xmlns:mc="http://schemas.openxmlformats.org/markup-compatibility/2006" xmlns:p14="http://schemas.microsoft.com/office/powerpoint/2010/main">
+    <mc:Choice Requires="p14">
+      <p:transition spd="slow" p14:dur="800">
+        <p:circle/>
+      </p:transition>
+    </mc:Choice>
+    <mc:Fallback xmlns="">
+      <p:transition spd="slow">
+        <p:circle/>
+      </p:transition>
+    </mc:Fallback>
+  </mc:AlternateContent>
+</p:sld>
+</file>
+
+<file path=ppt/slides/slide25.xml><?xml version="1.0" encoding="utf-8"?>
+<p:sld xmlns:a="http://schemas.openxmlformats.org/drawingml/2006/main" xmlns:r="http://schemas.openxmlformats.org/officeDocument/2006/relationships" xmlns:p="http://schemas.openxmlformats.org/presentationml/2006/main">
+  <p:cSld>
+    <p:bg>
+      <p:bgPr>
+        <a:blipFill dpi="0" rotWithShape="1">
           <a:blip r:embed="rId2">
             <a:lum/>
           </a:blip>
@@ -10661,7 +11801,7 @@
 </p:sld>
 </file>
 
-<file path=ppt/slides/slide25.xml><?xml version="1.0" encoding="utf-8"?>
+<file path=ppt/slides/slide26.xml><?xml version="1.0" encoding="utf-8"?>
 <p:sld xmlns:a="http://schemas.openxmlformats.org/drawingml/2006/main" xmlns:r="http://schemas.openxmlformats.org/officeDocument/2006/relationships" xmlns:p="http://schemas.openxmlformats.org/presentationml/2006/main">
   <p:cSld>
     <p:bg>
@@ -11541,7 +12681,7 @@
 </p:sld>
 </file>
 
-<file path=ppt/slides/slide26.xml><?xml version="1.0" encoding="utf-8"?>
+<file path=ppt/slides/slide27.xml><?xml version="1.0" encoding="utf-8"?>
 <p:sld xmlns:a="http://schemas.openxmlformats.org/drawingml/2006/main" xmlns:r="http://schemas.openxmlformats.org/officeDocument/2006/relationships" xmlns:p="http://schemas.openxmlformats.org/presentationml/2006/main">
   <p:cSld>
     <p:bg>
@@ -12148,7 +13288,7 @@
 </p:sld>
 </file>
 
-<file path=ppt/slides/slide27.xml><?xml version="1.0" encoding="utf-8"?>
+<file path=ppt/slides/slide28.xml><?xml version="1.0" encoding="utf-8"?>
 <p:sld xmlns:a="http://schemas.openxmlformats.org/drawingml/2006/main" xmlns:r="http://schemas.openxmlformats.org/officeDocument/2006/relationships" xmlns:p="http://schemas.openxmlformats.org/presentationml/2006/main">
   <p:cSld>
     <p:bg>
@@ -12932,7 +14072,7 @@
 </p:sld>
 </file>
 
-<file path=ppt/slides/slide28.xml><?xml version="1.0" encoding="utf-8"?>
+<file path=ppt/slides/slide29.xml><?xml version="1.0" encoding="utf-8"?>
 <p:sld xmlns:a="http://schemas.openxmlformats.org/drawingml/2006/main" xmlns:r="http://schemas.openxmlformats.org/officeDocument/2006/relationships" xmlns:p="http://schemas.openxmlformats.org/presentationml/2006/main">
   <p:cSld>
     <p:bg>
@@ -16767,4 +17907,299 @@
   <a:objectDefaults/>
   <a:extraClrSchemeLst/>
 </a:theme>
+</file>
+
+<file path=ppt/theme/theme2.xml><?xml version="1.0" encoding="utf-8"?>
+<a:theme xmlns:a="http://schemas.openxmlformats.org/drawingml/2006/main" name="Office Theme">
+  <a:themeElements>
+    <a:clrScheme name="Office">
+      <a:dk1>
+        <a:sysClr val="windowText" lastClr="000000"/>
+      </a:dk1>
+      <a:lt1>
+        <a:sysClr val="window" lastClr="FFFFFF"/>
+      </a:lt1>
+      <a:dk2>
+        <a:srgbClr val="44546A"/>
+      </a:dk2>
+      <a:lt2>
+        <a:srgbClr val="E7E6E6"/>
+      </a:lt2>
+      <a:accent1>
+        <a:srgbClr val="4472C4"/>
+      </a:accent1>
+      <a:accent2>
+        <a:srgbClr val="ED7D31"/>
+      </a:accent2>
+      <a:accent3>
+        <a:srgbClr val="A5A5A5"/>
+      </a:accent3>
+      <a:accent4>
+        <a:srgbClr val="FFC000"/>
+      </a:accent4>
+      <a:accent5>
+        <a:srgbClr val="5B9BD5"/>
+      </a:accent5>
+      <a:accent6>
+        <a:srgbClr val="70AD47"/>
+      </a:accent6>
+      <a:hlink>
+        <a:srgbClr val="0563C1"/>
+      </a:hlink>
+      <a:folHlink>
+        <a:srgbClr val="954F72"/>
+      </a:folHlink>
+    </a:clrScheme>
+    <a:fontScheme name="Office">
+      <a:majorFont>
+        <a:latin typeface="Calibri Light" panose="020F0302020204030204"/>
+        <a:ea typeface=""/>
+        <a:cs typeface=""/>
+        <a:font script="Jpan" typeface="游ゴシック Light"/>
+        <a:font script="Hang" typeface="맑은 고딕"/>
+        <a:font script="Hans" typeface="等线 Light"/>
+        <a:font script="Hant" typeface="新細明體"/>
+        <a:font script="Arab" typeface="Times New Roman"/>
+        <a:font script="Hebr" typeface="Times New Roman"/>
+        <a:font script="Thai" typeface="Angsana New"/>
+        <a:font script="Ethi" typeface="Nyala"/>
+        <a:font script="Beng" typeface="Vrinda"/>
+        <a:font script="Gujr" typeface="Shruti"/>
+        <a:font script="Khmr" typeface="MoolBoran"/>
+        <a:font script="Knda" typeface="Tunga"/>
+        <a:font script="Guru" typeface="Raavi"/>
+        <a:font script="Cans" typeface="Euphemia"/>
+        <a:font script="Cher" typeface="Plantagenet Cherokee"/>
+        <a:font script="Yiii" typeface="Microsoft Yi Baiti"/>
+        <a:font script="Tibt" typeface="Microsoft Himalaya"/>
+        <a:font script="Thaa" typeface="MV Boli"/>
+        <a:font script="Deva" typeface="Mangal"/>
+        <a:font script="Telu" typeface="Gautami"/>
+        <a:font script="Taml" typeface="Latha"/>
+        <a:font script="Syrc" typeface="Estrangelo Edessa"/>
+        <a:font script="Orya" typeface="Kalinga"/>
+        <a:font script="Mlym" typeface="Kartika"/>
+        <a:font script="Laoo" typeface="DokChampa"/>
+        <a:font script="Sinh" typeface="Iskoola Pota"/>
+        <a:font script="Mong" typeface="Mongolian Baiti"/>
+        <a:font script="Viet" typeface="Times New Roman"/>
+        <a:font script="Uigh" typeface="Microsoft Uighur"/>
+        <a:font script="Geor" typeface="Sylfaen"/>
+        <a:font script="Armn" typeface="Arial"/>
+        <a:font script="Bugi" typeface="Leelawadee UI"/>
+        <a:font script="Bopo" typeface="Microsoft JhengHei"/>
+        <a:font script="Java" typeface="Javanese Text"/>
+        <a:font script="Lisu" typeface="Segoe UI"/>
+        <a:font script="Mymr" typeface="Myanmar Text"/>
+        <a:font script="Nkoo" typeface="Ebrima"/>
+        <a:font script="Olck" typeface="Nirmala UI"/>
+        <a:font script="Osma" typeface="Ebrima"/>
+        <a:font script="Phag" typeface="Phagspa"/>
+        <a:font script="Syrn" typeface="Estrangelo Edessa"/>
+        <a:font script="Syrj" typeface="Estrangelo Edessa"/>
+        <a:font script="Syre" typeface="Estrangelo Edessa"/>
+        <a:font script="Sora" typeface="Nirmala UI"/>
+        <a:font script="Tale" typeface="Microsoft Tai Le"/>
+        <a:font script="Talu" typeface="Microsoft New Tai Lue"/>
+        <a:font script="Tfng" typeface="Ebrima"/>
+      </a:majorFont>
+      <a:minorFont>
+        <a:latin typeface="Calibri" panose="020F0502020204030204"/>
+        <a:ea typeface=""/>
+        <a:cs typeface=""/>
+        <a:font script="Jpan" typeface="游ゴシック"/>
+        <a:font script="Hang" typeface="맑은 고딕"/>
+        <a:font script="Hans" typeface="等线"/>
+        <a:font script="Hant" typeface="新細明體"/>
+        <a:font script="Arab" typeface="Arial"/>
+        <a:font script="Hebr" typeface="Arial"/>
+        <a:font script="Thai" typeface="Cordia New"/>
+        <a:font script="Ethi" typeface="Nyala"/>
+        <a:font script="Beng" typeface="Vrinda"/>
+        <a:font script="Gujr" typeface="Shruti"/>
+        <a:font script="Khmr" typeface="DaunPenh"/>
+        <a:font script="Knda" typeface="Tunga"/>
+        <a:font script="Guru" typeface="Raavi"/>
+        <a:font script="Cans" typeface="Euphemia"/>
+        <a:font script="Cher" typeface="Plantagenet Cherokee"/>
+        <a:font script="Yiii" typeface="Microsoft Yi Baiti"/>
+        <a:font script="Tibt" typeface="Microsoft Himalaya"/>
+        <a:font script="Thaa" typeface="MV Boli"/>
+        <a:font script="Deva" typeface="Mangal"/>
+        <a:font script="Telu" typeface="Gautami"/>
+        <a:font script="Taml" typeface="Latha"/>
+        <a:font script="Syrc" typeface="Estrangelo Edessa"/>
+        <a:font script="Orya" typeface="Kalinga"/>
+        <a:font script="Mlym" typeface="Kartika"/>
+        <a:font script="Laoo" typeface="DokChampa"/>
+        <a:font script="Sinh" typeface="Iskoola Pota"/>
+        <a:font script="Mong" typeface="Mongolian Baiti"/>
+        <a:font script="Viet" typeface="Arial"/>
+        <a:font script="Uigh" typeface="Microsoft Uighur"/>
+        <a:font script="Geor" typeface="Sylfaen"/>
+        <a:font script="Armn" typeface="Arial"/>
+        <a:font script="Bugi" typeface="Leelawadee UI"/>
+        <a:font script="Bopo" typeface="Microsoft JhengHei"/>
+        <a:font script="Java" typeface="Javanese Text"/>
+        <a:font script="Lisu" typeface="Segoe UI"/>
+        <a:font script="Mymr" typeface="Myanmar Text"/>
+        <a:font script="Nkoo" typeface="Ebrima"/>
+        <a:font script="Olck" typeface="Nirmala UI"/>
+        <a:font script="Osma" typeface="Ebrima"/>
+        <a:font script="Phag" typeface="Phagspa"/>
+        <a:font script="Syrn" typeface="Estrangelo Edessa"/>
+        <a:font script="Syrj" typeface="Estrangelo Edessa"/>
+        <a:font script="Syre" typeface="Estrangelo Edessa"/>
+        <a:font script="Sora" typeface="Nirmala UI"/>
+        <a:font script="Tale" typeface="Microsoft Tai Le"/>
+        <a:font script="Talu" typeface="Microsoft New Tai Lue"/>
+        <a:font script="Tfng" typeface="Ebrima"/>
+      </a:minorFont>
+    </a:fontScheme>
+    <a:fmtScheme name="Office">
+      <a:fillStyleLst>
+        <a:solidFill>
+          <a:schemeClr val="phClr"/>
+        </a:solidFill>
+        <a:gradFill rotWithShape="1">
+          <a:gsLst>
+            <a:gs pos="0">
+              <a:schemeClr val="phClr">
+                <a:lumMod val="110000"/>
+                <a:satMod val="105000"/>
+                <a:tint val="67000"/>
+              </a:schemeClr>
+            </a:gs>
+            <a:gs pos="50000">
+              <a:schemeClr val="phClr">
+                <a:lumMod val="105000"/>
+                <a:satMod val="103000"/>
+                <a:tint val="73000"/>
+              </a:schemeClr>
+            </a:gs>
+            <a:gs pos="100000">
+              <a:schemeClr val="phClr">
+                <a:lumMod val="105000"/>
+                <a:satMod val="109000"/>
+                <a:tint val="81000"/>
+              </a:schemeClr>
+            </a:gs>
+          </a:gsLst>
+          <a:lin ang="5400000" scaled="0"/>
+        </a:gradFill>
+        <a:gradFill rotWithShape="1">
+          <a:gsLst>
+            <a:gs pos="0">
+              <a:schemeClr val="phClr">
+                <a:satMod val="103000"/>
+                <a:lumMod val="102000"/>
+                <a:tint val="94000"/>
+              </a:schemeClr>
+            </a:gs>
+            <a:gs pos="50000">
+              <a:schemeClr val="phClr">
+                <a:satMod val="110000"/>
+                <a:lumMod val="100000"/>
+                <a:shade val="100000"/>
+              </a:schemeClr>
+            </a:gs>
+            <a:gs pos="100000">
+              <a:schemeClr val="phClr">
+                <a:lumMod val="99000"/>
+                <a:satMod val="120000"/>
+                <a:shade val="78000"/>
+              </a:schemeClr>
+            </a:gs>
+          </a:gsLst>
+          <a:lin ang="5400000" scaled="0"/>
+        </a:gradFill>
+      </a:fillStyleLst>
+      <a:lnStyleLst>
+        <a:ln w="6350" cap="flat" cmpd="sng" algn="ctr">
+          <a:solidFill>
+            <a:schemeClr val="phClr"/>
+          </a:solidFill>
+          <a:prstDash val="solid"/>
+          <a:miter lim="800000"/>
+        </a:ln>
+        <a:ln w="12700" cap="flat" cmpd="sng" algn="ctr">
+          <a:solidFill>
+            <a:schemeClr val="phClr"/>
+          </a:solidFill>
+          <a:prstDash val="solid"/>
+          <a:miter lim="800000"/>
+        </a:ln>
+        <a:ln w="19050" cap="flat" cmpd="sng" algn="ctr">
+          <a:solidFill>
+            <a:schemeClr val="phClr"/>
+          </a:solidFill>
+          <a:prstDash val="solid"/>
+          <a:miter lim="800000"/>
+        </a:ln>
+      </a:lnStyleLst>
+      <a:effectStyleLst>
+        <a:effectStyle>
+          <a:effectLst/>
+        </a:effectStyle>
+        <a:effectStyle>
+          <a:effectLst/>
+        </a:effectStyle>
+        <a:effectStyle>
+          <a:effectLst>
+            <a:outerShdw blurRad="57150" dist="19050" dir="5400000" algn="ctr" rotWithShape="0">
+              <a:srgbClr val="000000">
+                <a:alpha val="63000"/>
+              </a:srgbClr>
+            </a:outerShdw>
+          </a:effectLst>
+        </a:effectStyle>
+      </a:effectStyleLst>
+      <a:bgFillStyleLst>
+        <a:solidFill>
+          <a:schemeClr val="phClr"/>
+        </a:solidFill>
+        <a:solidFill>
+          <a:schemeClr val="phClr">
+            <a:tint val="95000"/>
+            <a:satMod val="170000"/>
+          </a:schemeClr>
+        </a:solidFill>
+        <a:gradFill rotWithShape="1">
+          <a:gsLst>
+            <a:gs pos="0">
+              <a:schemeClr val="phClr">
+                <a:tint val="93000"/>
+                <a:satMod val="150000"/>
+                <a:shade val="98000"/>
+                <a:lumMod val="102000"/>
+              </a:schemeClr>
+            </a:gs>
+            <a:gs pos="50000">
+              <a:schemeClr val="phClr">
+                <a:tint val="98000"/>
+                <a:satMod val="130000"/>
+                <a:shade val="90000"/>
+                <a:lumMod val="103000"/>
+              </a:schemeClr>
+            </a:gs>
+            <a:gs pos="100000">
+              <a:schemeClr val="phClr">
+                <a:shade val="63000"/>
+                <a:satMod val="120000"/>
+              </a:schemeClr>
+            </a:gs>
+          </a:gsLst>
+          <a:lin ang="5400000" scaled="0"/>
+        </a:gradFill>
+      </a:bgFillStyleLst>
+    </a:fmtScheme>
+  </a:themeElements>
+  <a:objectDefaults/>
+  <a:extraClrSchemeLst/>
+  <a:extLst>
+    <a:ext uri="{05A4C25C-085E-4340-85A3-A5531E510DB2}">
+      <thm15:themeFamily xmlns:thm15="http://schemas.microsoft.com/office/thememl/2012/main" name="Office Theme" id="{62F939B6-93AF-4DB8-9C6B-D6C7DFDC589F}" vid="{4A3C46E8-61CC-4603-A589-7422A47A8E4A}"/>
+    </a:ext>
+  </a:extLst>
+</a:theme>
 </file>
</xml_diff>

<commit_message>
update rumus NB di power point
</commit_message>
<xml_diff>
--- a/Presentation TA.pptx
+++ b/Presentation TA.pptx
@@ -10805,38 +10805,6 @@
           </a:p>
         </p:txBody>
       </p:sp>
-      <p:pic>
-        <p:nvPicPr>
-          <p:cNvPr id="8" name="Content Placeholder 7">
-            <a:extLst>
-              <a:ext uri="{FF2B5EF4-FFF2-40B4-BE49-F238E27FC236}">
-                <a16:creationId xmlns:a16="http://schemas.microsoft.com/office/drawing/2014/main" id="{5841FB6D-811E-4CEF-8638-C906CEC91EB7}"/>
-              </a:ext>
-            </a:extLst>
-          </p:cNvPr>
-          <p:cNvPicPr>
-            <a:picLocks noGrp="1" noChangeAspect="1"/>
-          </p:cNvPicPr>
-          <p:nvPr>
-            <p:ph sz="quarter" idx="2"/>
-          </p:nvPr>
-        </p:nvPicPr>
-        <p:blipFill>
-          <a:blip r:embed="rId4"/>
-          <a:stretch>
-            <a:fillRect/>
-          </a:stretch>
-        </p:blipFill>
-        <p:spPr>
-          <a:xfrm>
-            <a:off x="683568" y="1680477"/>
-            <a:ext cx="8064896" cy="1316475"/>
-          </a:xfrm>
-          <a:prstGeom prst="rect">
-            <a:avLst/>
-          </a:prstGeom>
-        </p:spPr>
-      </p:pic>
       <p:sp>
         <p:nvSpPr>
           <p:cNvPr id="20" name="Content Placeholder 2">
@@ -10853,8 +10821,8 @@
         </p:nvSpPr>
         <p:spPr>
           <a:xfrm>
-            <a:off x="548072" y="3536184"/>
-            <a:ext cx="8290050" cy="3205184"/>
+            <a:off x="539552" y="2888432"/>
+            <a:ext cx="8424936" cy="3852936"/>
           </a:xfrm>
           <a:prstGeom prst="rect">
             <a:avLst/>
@@ -10862,7 +10830,7 @@
         </p:spPr>
         <p:txBody>
           <a:bodyPr vert="horz">
-            <a:normAutofit/>
+            <a:normAutofit lnSpcReduction="10000"/>
           </a:bodyPr>
           <a:lstStyle>
             <a:lvl1pPr marL="274320" indent="-274320" algn="l" rtl="0" eaLnBrk="1" latinLnBrk="0" hangingPunct="1">
@@ -11048,7 +11016,7 @@
                 <a:latin typeface="Times New Roman" panose="02020603050405020304" pitchFamily="18" charset="0"/>
                 <a:cs typeface="Times New Roman" panose="02020603050405020304" pitchFamily="18" charset="0"/>
               </a:rPr>
-              <a:t>X	     = Data </a:t>
+              <a:t>E	     = Data </a:t>
             </a:r>
             <a:r>
               <a:rPr lang="en-US" sz="2200" dirty="0" err="1">
@@ -11202,7 +11170,7 @@
                 <a:latin typeface="Times New Roman" panose="02020603050405020304" pitchFamily="18" charset="0"/>
                 <a:cs typeface="Times New Roman" panose="02020603050405020304" pitchFamily="18" charset="0"/>
               </a:rPr>
-              <a:t>P(H|X    = </a:t>
+              <a:t>P(H|E)   = </a:t>
             </a:r>
             <a:r>
               <a:rPr lang="en-US" sz="2200" dirty="0" err="1">
@@ -11223,6 +11191,34 @@
                 <a:latin typeface="Times New Roman" panose="02020603050405020304" pitchFamily="18" charset="0"/>
                 <a:cs typeface="Times New Roman" panose="02020603050405020304" pitchFamily="18" charset="0"/>
               </a:rPr>
+              <a:t>akhir</a:t>
+            </a:r>
+            <a:r>
+              <a:rPr lang="en-US" sz="2200" dirty="0">
+                <a:latin typeface="Times New Roman" panose="02020603050405020304" pitchFamily="18" charset="0"/>
+                <a:cs typeface="Times New Roman" panose="02020603050405020304" pitchFamily="18" charset="0"/>
+              </a:rPr>
+              <a:t> </a:t>
+            </a:r>
+            <a:r>
+              <a:rPr lang="en-US" sz="2200" dirty="0" err="1">
+                <a:latin typeface="Times New Roman" panose="02020603050405020304" pitchFamily="18" charset="0"/>
+                <a:cs typeface="Times New Roman" panose="02020603050405020304" pitchFamily="18" charset="0"/>
+              </a:rPr>
+              <a:t>bersyaratsuatu</a:t>
+            </a:r>
+            <a:r>
+              <a:rPr lang="en-US" sz="2200" dirty="0">
+                <a:latin typeface="Times New Roman" panose="02020603050405020304" pitchFamily="18" charset="0"/>
+                <a:cs typeface="Times New Roman" panose="02020603050405020304" pitchFamily="18" charset="0"/>
+              </a:rPr>
+              <a:t> </a:t>
+            </a:r>
+            <a:r>
+              <a:rPr lang="en-US" sz="2200" dirty="0" err="1">
+                <a:latin typeface="Times New Roman" panose="02020603050405020304" pitchFamily="18" charset="0"/>
+                <a:cs typeface="Times New Roman" panose="02020603050405020304" pitchFamily="18" charset="0"/>
+              </a:rPr>
               <a:t>hipotesis</a:t>
             </a:r>
             <a:r>
@@ -11237,7 +11233,7 @@
                 <a:latin typeface="Times New Roman" panose="02020603050405020304" pitchFamily="18" charset="0"/>
                 <a:cs typeface="Times New Roman" panose="02020603050405020304" pitchFamily="18" charset="0"/>
               </a:rPr>
-              <a:t>berdasarkan</a:t>
+              <a:t>terjadi</a:t>
             </a:r>
             <a:r>
               <a:rPr lang="en-US" sz="2200" dirty="0">
@@ -11251,15 +11247,66 @@
                 <a:latin typeface="Times New Roman" panose="02020603050405020304" pitchFamily="18" charset="0"/>
                 <a:cs typeface="Times New Roman" panose="02020603050405020304" pitchFamily="18" charset="0"/>
               </a:rPr>
-              <a:t>kondisi</a:t>
+              <a:t>jika</a:t>
             </a:r>
             <a:r>
               <a:rPr lang="en-US" sz="2200" dirty="0">
                 <a:latin typeface="Times New Roman" panose="02020603050405020304" pitchFamily="18" charset="0"/>
                 <a:cs typeface="Times New Roman" panose="02020603050405020304" pitchFamily="18" charset="0"/>
               </a:rPr>
-              <a:t> X</a:t>
-            </a:r>
+              <a:t> di     </a:t>
+            </a:r>
+          </a:p>
+          <a:p>
+            <a:pPr marL="0" indent="0" algn="just">
+              <a:buNone/>
+            </a:pPr>
+            <a:r>
+              <a:rPr lang="en-US" sz="2200" dirty="0">
+                <a:latin typeface="Times New Roman" panose="02020603050405020304" pitchFamily="18" charset="0"/>
+                <a:cs typeface="Times New Roman" panose="02020603050405020304" pitchFamily="18" charset="0"/>
+              </a:rPr>
+              <a:t>                     </a:t>
+            </a:r>
+            <a:r>
+              <a:rPr lang="en-US" sz="2200" dirty="0" err="1">
+                <a:latin typeface="Times New Roman" panose="02020603050405020304" pitchFamily="18" charset="0"/>
+                <a:cs typeface="Times New Roman" panose="02020603050405020304" pitchFamily="18" charset="0"/>
+              </a:rPr>
+              <a:t>berikan</a:t>
+            </a:r>
+            <a:r>
+              <a:rPr lang="en-US" sz="2200" dirty="0">
+                <a:latin typeface="Times New Roman" panose="02020603050405020304" pitchFamily="18" charset="0"/>
+                <a:cs typeface="Times New Roman" panose="02020603050405020304" pitchFamily="18" charset="0"/>
+              </a:rPr>
+              <a:t> </a:t>
+            </a:r>
+            <a:r>
+              <a:rPr lang="en-US" sz="2200" dirty="0" err="1">
+                <a:latin typeface="Times New Roman" panose="02020603050405020304" pitchFamily="18" charset="0"/>
+                <a:cs typeface="Times New Roman" panose="02020603050405020304" pitchFamily="18" charset="0"/>
+              </a:rPr>
+              <a:t>bukti</a:t>
+            </a:r>
+            <a:r>
+              <a:rPr lang="en-US" sz="2200" dirty="0">
+                <a:latin typeface="Times New Roman" panose="02020603050405020304" pitchFamily="18" charset="0"/>
+                <a:cs typeface="Times New Roman" panose="02020603050405020304" pitchFamily="18" charset="0"/>
+              </a:rPr>
+              <a:t> (evidence) E </a:t>
+            </a:r>
+            <a:r>
+              <a:rPr lang="en-US" sz="2200" dirty="0" err="1">
+                <a:latin typeface="Times New Roman" panose="02020603050405020304" pitchFamily="18" charset="0"/>
+                <a:cs typeface="Times New Roman" panose="02020603050405020304" pitchFamily="18" charset="0"/>
+              </a:rPr>
+              <a:t>terjadi</a:t>
+            </a:r>
+            <a:endParaRPr lang="en-US" sz="2200" dirty="0">
+              <a:latin typeface="Times New Roman" panose="02020603050405020304" pitchFamily="18" charset="0"/>
+              <a:cs typeface="Times New Roman" panose="02020603050405020304" pitchFamily="18" charset="0"/>
+            </a:endParaRPr>
           </a:p>
           <a:p>
             <a:pPr algn="just"/>
@@ -11289,38 +11336,14 @@
                 <a:latin typeface="Times New Roman" panose="02020603050405020304" pitchFamily="18" charset="0"/>
                 <a:cs typeface="Times New Roman" panose="02020603050405020304" pitchFamily="18" charset="0"/>
               </a:rPr>
-              <a:t>hipotesis</a:t>
+              <a:t>awal</a:t>
             </a:r>
             <a:r>
               <a:rPr lang="en-US" sz="2200" dirty="0">
                 <a:latin typeface="Times New Roman" panose="02020603050405020304" pitchFamily="18" charset="0"/>
                 <a:cs typeface="Times New Roman" panose="02020603050405020304" pitchFamily="18" charset="0"/>
               </a:rPr>
-              <a:t> H</a:t>
-            </a:r>
-          </a:p>
-          <a:p>
-            <a:pPr algn="just"/>
-            <a:r>
-              <a:rPr lang="en-US" sz="2200" dirty="0">
-                <a:latin typeface="Times New Roman" panose="02020603050405020304" pitchFamily="18" charset="0"/>
-                <a:cs typeface="Times New Roman" panose="02020603050405020304" pitchFamily="18" charset="0"/>
-              </a:rPr>
-              <a:t>P(X|H    = </a:t>
-            </a:r>
-            <a:r>
-              <a:rPr lang="en-US" sz="2200" dirty="0" err="1">
-                <a:latin typeface="Times New Roman" panose="02020603050405020304" pitchFamily="18" charset="0"/>
-                <a:cs typeface="Times New Roman" panose="02020603050405020304" pitchFamily="18" charset="0"/>
-              </a:rPr>
-              <a:t>Probabilitas</a:t>
-            </a:r>
-            <a:r>
-              <a:rPr lang="en-US" sz="2200" dirty="0">
-                <a:latin typeface="Times New Roman" panose="02020603050405020304" pitchFamily="18" charset="0"/>
-                <a:cs typeface="Times New Roman" panose="02020603050405020304" pitchFamily="18" charset="0"/>
-              </a:rPr>
-              <a:t> </a:t>
+              <a:t> (priori) </a:t>
             </a:r>
             <a:r>
               <a:rPr lang="en-US" sz="2200" dirty="0" err="1">
@@ -11334,14 +11357,14 @@
                 <a:latin typeface="Times New Roman" panose="02020603050405020304" pitchFamily="18" charset="0"/>
                 <a:cs typeface="Times New Roman" panose="02020603050405020304" pitchFamily="18" charset="0"/>
               </a:rPr>
-              <a:t> X </a:t>
+              <a:t> H </a:t>
             </a:r>
             <a:r>
               <a:rPr lang="en-US" sz="2200" dirty="0" err="1">
                 <a:latin typeface="Times New Roman" panose="02020603050405020304" pitchFamily="18" charset="0"/>
                 <a:cs typeface="Times New Roman" panose="02020603050405020304" pitchFamily="18" charset="0"/>
               </a:rPr>
-              <a:t>berdasarkan</a:t>
+              <a:t>terjadi</a:t>
             </a:r>
             <a:r>
               <a:rPr lang="en-US" sz="2200" dirty="0">
@@ -11355,42 +11378,365 @@
                 <a:latin typeface="Times New Roman" panose="02020603050405020304" pitchFamily="18" charset="0"/>
                 <a:cs typeface="Times New Roman" panose="02020603050405020304" pitchFamily="18" charset="0"/>
               </a:rPr>
-              <a:t>kondisi</a:t>
+              <a:t>tanpa</a:t>
             </a:r>
             <a:r>
               <a:rPr lang="en-US" sz="2200" dirty="0">
                 <a:latin typeface="Times New Roman" panose="02020603050405020304" pitchFamily="18" charset="0"/>
                 <a:cs typeface="Times New Roman" panose="02020603050405020304" pitchFamily="18" charset="0"/>
               </a:rPr>
-              <a:t> H</a:t>
-            </a:r>
-          </a:p>
-          <a:p>
-            <a:pPr algn="just"/>
+              <a:t> </a:t>
+            </a:r>
+            <a:r>
+              <a:rPr lang="en-US" sz="2200" dirty="0" err="1">
+                <a:latin typeface="Times New Roman" panose="02020603050405020304" pitchFamily="18" charset="0"/>
+                <a:cs typeface="Times New Roman" panose="02020603050405020304" pitchFamily="18" charset="0"/>
+              </a:rPr>
+              <a:t>bukti</a:t>
+            </a:r>
             <a:r>
               <a:rPr lang="en-US" sz="2200" dirty="0">
                 <a:latin typeface="Times New Roman" panose="02020603050405020304" pitchFamily="18" charset="0"/>
                 <a:cs typeface="Times New Roman" panose="02020603050405020304" pitchFamily="18" charset="0"/>
               </a:rPr>
-              <a:t>P(X)      = </a:t>
+              <a:t> </a:t>
+            </a:r>
+          </a:p>
+          <a:p>
+            <a:pPr marL="0" indent="0" algn="just">
+              <a:buNone/>
+            </a:pPr>
+            <a:r>
+              <a:rPr lang="en-US" sz="2200" dirty="0">
+                <a:latin typeface="Times New Roman" panose="02020603050405020304" pitchFamily="18" charset="0"/>
+                <a:cs typeface="Times New Roman" panose="02020603050405020304" pitchFamily="18" charset="0"/>
+              </a:rPr>
+              <a:t>                     </a:t>
             </a:r>
             <a:r>
               <a:rPr lang="en-US" sz="2200" dirty="0" err="1">
                 <a:latin typeface="Times New Roman" panose="02020603050405020304" pitchFamily="18" charset="0"/>
                 <a:cs typeface="Times New Roman" panose="02020603050405020304" pitchFamily="18" charset="0"/>
               </a:rPr>
-              <a:t>Probabilitas</a:t>
-            </a:r>
+              <a:t>apapun</a:t>
+            </a:r>
+            <a:endParaRPr lang="en-US" sz="2200" dirty="0">
+              <a:latin typeface="Times New Roman" panose="02020603050405020304" pitchFamily="18" charset="0"/>
+              <a:cs typeface="Times New Roman" panose="02020603050405020304" pitchFamily="18" charset="0"/>
+            </a:endParaRPr>
+          </a:p>
+          <a:p>
+            <a:pPr algn="just"/>
             <a:r>
               <a:rPr lang="en-US" sz="2200" dirty="0">
                 <a:latin typeface="Times New Roman" panose="02020603050405020304" pitchFamily="18" charset="0"/>
                 <a:cs typeface="Times New Roman" panose="02020603050405020304" pitchFamily="18" charset="0"/>
               </a:rPr>
-              <a:t> X</a:t>
-            </a:r>
+              <a:t>P(E|H)   = </a:t>
+            </a:r>
+            <a:r>
+              <a:rPr lang="id-ID" sz="2200" dirty="0">
+                <a:latin typeface="Times New Roman" panose="02020603050405020304" pitchFamily="18" charset="0"/>
+                <a:cs typeface="Times New Roman" panose="02020603050405020304" pitchFamily="18" charset="0"/>
+              </a:rPr>
+              <a:t>Probabilitas sebuah bukti E terjadi akan pengaruh </a:t>
+            </a:r>
+            <a:endParaRPr lang="en-US" sz="2200" dirty="0">
+              <a:latin typeface="Times New Roman" panose="02020603050405020304" pitchFamily="18" charset="0"/>
+              <a:cs typeface="Times New Roman" panose="02020603050405020304" pitchFamily="18" charset="0"/>
+            </a:endParaRPr>
+          </a:p>
+          <a:p>
+            <a:pPr marL="0" indent="0" algn="just">
+              <a:buNone/>
+            </a:pPr>
+            <a:r>
+              <a:rPr lang="en-US" sz="2200" dirty="0">
+                <a:latin typeface="Times New Roman" panose="02020603050405020304" pitchFamily="18" charset="0"/>
+                <a:cs typeface="Times New Roman" panose="02020603050405020304" pitchFamily="18" charset="0"/>
+              </a:rPr>
+              <a:t>                     </a:t>
+            </a:r>
+            <a:r>
+              <a:rPr lang="id-ID" sz="2200" dirty="0">
+                <a:latin typeface="Times New Roman" panose="02020603050405020304" pitchFamily="18" charset="0"/>
+                <a:cs typeface="Times New Roman" panose="02020603050405020304" pitchFamily="18" charset="0"/>
+              </a:rPr>
+              <a:t>hipotesis H </a:t>
+            </a:r>
+            <a:endParaRPr lang="en-US" sz="2200" dirty="0">
+              <a:latin typeface="Times New Roman" panose="02020603050405020304" pitchFamily="18" charset="0"/>
+              <a:cs typeface="Times New Roman" panose="02020603050405020304" pitchFamily="18" charset="0"/>
+            </a:endParaRPr>
+          </a:p>
+          <a:p>
+            <a:pPr algn="just"/>
+            <a:r>
+              <a:rPr lang="en-US" sz="2200" dirty="0">
+                <a:latin typeface="Times New Roman" panose="02020603050405020304" pitchFamily="18" charset="0"/>
+                <a:cs typeface="Times New Roman" panose="02020603050405020304" pitchFamily="18" charset="0"/>
+              </a:rPr>
+              <a:t>P(E)      = </a:t>
+            </a:r>
+            <a:r>
+              <a:rPr lang="id-ID" sz="2200" dirty="0">
+                <a:latin typeface="Times New Roman" panose="02020603050405020304" pitchFamily="18" charset="0"/>
+                <a:cs typeface="Times New Roman" panose="02020603050405020304" pitchFamily="18" charset="0"/>
+              </a:rPr>
+              <a:t>Probabilitas awal (Priori) bukti E terjadi tanpa memandang </a:t>
+            </a:r>
+            <a:endParaRPr lang="en-US" sz="2200" dirty="0">
+              <a:latin typeface="Times New Roman" panose="02020603050405020304" pitchFamily="18" charset="0"/>
+              <a:cs typeface="Times New Roman" panose="02020603050405020304" pitchFamily="18" charset="0"/>
+            </a:endParaRPr>
+          </a:p>
+          <a:p>
+            <a:pPr marL="0" indent="0" algn="just">
+              <a:buNone/>
+            </a:pPr>
+            <a:r>
+              <a:rPr lang="en-US" sz="2200" dirty="0">
+                <a:latin typeface="Times New Roman" panose="02020603050405020304" pitchFamily="18" charset="0"/>
+                <a:cs typeface="Times New Roman" panose="02020603050405020304" pitchFamily="18" charset="0"/>
+              </a:rPr>
+              <a:t>                     </a:t>
+            </a:r>
+            <a:r>
+              <a:rPr lang="id-ID" sz="2200" dirty="0">
+                <a:latin typeface="Times New Roman" panose="02020603050405020304" pitchFamily="18" charset="0"/>
+                <a:cs typeface="Times New Roman" panose="02020603050405020304" pitchFamily="18" charset="0"/>
+              </a:rPr>
+              <a:t>hipotesis/bukti yang lain</a:t>
+            </a:r>
+            <a:endParaRPr lang="en-US" sz="2200" dirty="0">
+              <a:latin typeface="Times New Roman" panose="02020603050405020304" pitchFamily="18" charset="0"/>
+              <a:cs typeface="Times New Roman" panose="02020603050405020304" pitchFamily="18" charset="0"/>
+            </a:endParaRPr>
           </a:p>
         </p:txBody>
       </p:sp>
+      <mc:AlternateContent xmlns:mc="http://schemas.openxmlformats.org/markup-compatibility/2006">
+        <mc:Choice xmlns:a14="http://schemas.microsoft.com/office/drawing/2010/main" Requires="a14">
+          <p:sp>
+            <p:nvSpPr>
+              <p:cNvPr id="4" name="Content Placeholder 3">
+                <a:extLst>
+                  <a:ext uri="{FF2B5EF4-FFF2-40B4-BE49-F238E27FC236}">
+                    <a16:creationId xmlns:a16="http://schemas.microsoft.com/office/drawing/2014/main" id="{29177BC9-EB14-4A4E-BF05-6CAB49235175}"/>
+                  </a:ext>
+                </a:extLst>
+              </p:cNvPr>
+              <p:cNvSpPr>
+                <a:spLocks noGrp="1"/>
+              </p:cNvSpPr>
+              <p:nvPr>
+                <p:ph sz="quarter" idx="2"/>
+              </p:nvPr>
+            </p:nvSpPr>
+            <p:spPr>
+              <a:xfrm>
+                <a:off x="1475656" y="1287016"/>
+                <a:ext cx="6686128" cy="917848"/>
+              </a:xfrm>
+            </p:spPr>
+            <p:txBody>
+              <a:bodyPr>
+                <a:noAutofit/>
+              </a:bodyPr>
+              <a:lstStyle/>
+              <a:p>
+                <a:pPr marL="0" indent="0">
+                  <a:buNone/>
+                </a:pPr>
+                <a14:m>
+                  <m:oMathPara xmlns:m="http://schemas.openxmlformats.org/officeDocument/2006/math">
+                    <m:oMathParaPr>
+                      <m:jc m:val="centerGroup"/>
+                    </m:oMathParaPr>
+                    <m:oMath xmlns:m="http://schemas.openxmlformats.org/officeDocument/2006/math">
+                      <m:r>
+                        <m:rPr>
+                          <m:sty m:val="p"/>
+                        </m:rPr>
+                        <a:rPr lang="id-ID" sz="4000" smtClean="0"/>
+                        <m:t>P</m:t>
+                      </m:r>
+                      <m:d>
+                        <m:dPr>
+                          <m:ctrlPr>
+                            <a:rPr lang="en-ID" sz="4000" i="1"/>
+                          </m:ctrlPr>
+                        </m:dPr>
+                        <m:e>
+                          <m:r>
+                            <m:rPr>
+                              <m:sty m:val="p"/>
+                            </m:rPr>
+                            <a:rPr lang="id-ID" sz="4000"/>
+                            <m:t>H</m:t>
+                          </m:r>
+                        </m:e>
+                        <m:e>
+                          <m:r>
+                            <m:rPr>
+                              <m:sty m:val="p"/>
+                            </m:rPr>
+                            <a:rPr lang="id-ID" sz="4000"/>
+                            <m:t>E</m:t>
+                          </m:r>
+                        </m:e>
+                      </m:d>
+                      <m:r>
+                        <a:rPr lang="id-ID" sz="4000"/>
+                        <m:t>=</m:t>
+                      </m:r>
+                      <m:f>
+                        <m:fPr>
+                          <m:ctrlPr>
+                            <a:rPr lang="en-ID" sz="4000" i="1"/>
+                          </m:ctrlPr>
+                        </m:fPr>
+                        <m:num>
+                          <m:r>
+                            <m:rPr>
+                              <m:sty m:val="p"/>
+                            </m:rPr>
+                            <a:rPr lang="id-ID" sz="4000">
+                              <a:latin typeface="Cambria Math" panose="02040503050406030204" pitchFamily="18" charset="0"/>
+                            </a:rPr>
+                            <m:t>P</m:t>
+                          </m:r>
+                          <m:d>
+                            <m:dPr>
+                              <m:ctrlPr>
+                                <a:rPr lang="en-ID" sz="4000" i="1"/>
+                              </m:ctrlPr>
+                            </m:dPr>
+                            <m:e>
+                              <m:r>
+                                <m:rPr>
+                                  <m:sty m:val="p"/>
+                                </m:rPr>
+                                <a:rPr lang="id-ID" sz="4000"/>
+                                <m:t>E</m:t>
+                              </m:r>
+                            </m:e>
+                            <m:e>
+                              <m:r>
+                                <m:rPr>
+                                  <m:sty m:val="p"/>
+                                </m:rPr>
+                                <a:rPr lang="id-ID" sz="4000"/>
+                                <m:t>H</m:t>
+                              </m:r>
+                            </m:e>
+                          </m:d>
+                          <m:r>
+                            <a:rPr lang="id-ID" sz="4000" i="1"/>
+                            <m:t>𝑥</m:t>
+                          </m:r>
+                          <m:r>
+                            <m:rPr>
+                              <m:sty m:val="p"/>
+                            </m:rPr>
+                            <a:rPr lang="id-ID" sz="4000"/>
+                            <m:t>P</m:t>
+                          </m:r>
+                          <m:d>
+                            <m:dPr>
+                              <m:ctrlPr>
+                                <a:rPr lang="en-ID" sz="4000" i="1"/>
+                              </m:ctrlPr>
+                            </m:dPr>
+                            <m:e>
+                              <m:r>
+                                <m:rPr>
+                                  <m:sty m:val="p"/>
+                                </m:rPr>
+                                <a:rPr lang="id-ID" sz="4000"/>
+                                <m:t>H</m:t>
+                              </m:r>
+                            </m:e>
+                          </m:d>
+                        </m:num>
+                        <m:den>
+                          <m:r>
+                            <m:rPr>
+                              <m:sty m:val="p"/>
+                            </m:rPr>
+                            <a:rPr lang="id-ID" sz="4000"/>
+                            <m:t>P</m:t>
+                          </m:r>
+                          <m:d>
+                            <m:dPr>
+                              <m:ctrlPr>
+                                <a:rPr lang="en-ID" sz="4000" i="1"/>
+                              </m:ctrlPr>
+                            </m:dPr>
+                            <m:e>
+                              <m:r>
+                                <m:rPr>
+                                  <m:sty m:val="p"/>
+                                </m:rPr>
+                                <a:rPr lang="id-ID" sz="4000"/>
+                                <m:t>E</m:t>
+                              </m:r>
+                            </m:e>
+                          </m:d>
+                        </m:den>
+                      </m:f>
+                    </m:oMath>
+                  </m:oMathPara>
+                </a14:m>
+                <a:endParaRPr lang="en-ID" sz="4000" dirty="0"/>
+              </a:p>
+            </p:txBody>
+          </p:sp>
+        </mc:Choice>
+        <mc:Fallback>
+          <p:sp>
+            <p:nvSpPr>
+              <p:cNvPr id="4" name="Content Placeholder 3">
+                <a:extLst>
+                  <a:ext uri="{FF2B5EF4-FFF2-40B4-BE49-F238E27FC236}">
+                    <a16:creationId xmlns:a16="http://schemas.microsoft.com/office/drawing/2014/main" id="{29177BC9-EB14-4A4E-BF05-6CAB49235175}"/>
+                  </a:ext>
+                </a:extLst>
+              </p:cNvPr>
+              <p:cNvSpPr>
+                <a:spLocks noGrp="1" noRot="1" noChangeAspect="1" noMove="1" noResize="1" noEditPoints="1" noAdjustHandles="1" noChangeArrowheads="1" noChangeShapeType="1" noTextEdit="1"/>
+              </p:cNvSpPr>
+              <p:nvPr>
+                <p:ph sz="quarter" idx="2"/>
+              </p:nvPr>
+            </p:nvSpPr>
+            <p:spPr>
+              <a:xfrm>
+                <a:off x="1475656" y="1287016"/>
+                <a:ext cx="6686128" cy="917848"/>
+              </a:xfrm>
+              <a:blipFill>
+                <a:blip r:embed="rId4"/>
+                <a:stretch>
+                  <a:fillRect b="-43709"/>
+                </a:stretch>
+              </a:blipFill>
+            </p:spPr>
+            <p:txBody>
+              <a:bodyPr/>
+              <a:lstStyle/>
+              <a:p>
+                <a:r>
+                  <a:rPr lang="en-ID">
+                    <a:noFill/>
+                  </a:rPr>
+                  <a:t> </a:t>
+                </a:r>
+              </a:p>
+            </p:txBody>
+          </p:sp>
+        </mc:Fallback>
+      </mc:AlternateContent>
     </p:spTree>
     <p:extLst>
       <p:ext uri="{BB962C8B-B14F-4D97-AF65-F5344CB8AC3E}">
@@ -11535,7 +11881,7 @@
         </p:nvSpPr>
         <p:spPr>
           <a:xfrm>
-            <a:off x="838200" y="1456184"/>
+            <a:off x="827584" y="4725144"/>
             <a:ext cx="7467600" cy="892696"/>
           </a:xfrm>
         </p:spPr>
@@ -11547,7 +11893,7 @@
           <a:p>
             <a:r>
               <a:rPr lang="en-US" dirty="0"/>
-              <a:t>Administrator</a:t>
+              <a:t>Admin</a:t>
             </a:r>
           </a:p>
           <a:p>
@@ -11555,7 +11901,7 @@
               <a:rPr lang="en-ID" dirty="0">
                 <a:hlinkClick r:id="rId3"/>
               </a:rPr>
-              <a:t>http://localhost/DM_bantuan/</a:t>
+              <a:t>http://bantuan.hutangcat.dx.am/</a:t>
             </a:r>
             <a:endParaRPr lang="en-US" dirty="0"/>
           </a:p>
@@ -11577,7 +11923,7 @@
         </p:nvSpPr>
         <p:spPr>
           <a:xfrm>
-            <a:off x="838200" y="2824336"/>
+            <a:off x="838200" y="2968352"/>
             <a:ext cx="7467600" cy="892696"/>
           </a:xfrm>
           <a:prstGeom prst="rect">
@@ -11768,7 +12114,7 @@
           <a:p>
             <a:r>
               <a:rPr lang="en-US" dirty="0"/>
-              <a:t>Client</a:t>
+              <a:t>Administrator</a:t>
             </a:r>
           </a:p>
           <a:p>
@@ -11777,6 +12123,876 @@
                 <a:hlinkClick r:id="rId4"/>
               </a:rPr>
               <a:t>http://localhost/DM_bantuan/admin0065/</a:t>
+            </a:r>
+            <a:endParaRPr lang="en-US" dirty="0"/>
+          </a:p>
+        </p:txBody>
+      </p:sp>
+      <p:sp>
+        <p:nvSpPr>
+          <p:cNvPr id="5" name="Content Placeholder 2">
+            <a:extLst>
+              <a:ext uri="{FF2B5EF4-FFF2-40B4-BE49-F238E27FC236}">
+                <a16:creationId xmlns:a16="http://schemas.microsoft.com/office/drawing/2014/main" id="{73A0DC63-BEE8-4694-A64E-CB70FFA77128}"/>
+              </a:ext>
+            </a:extLst>
+          </p:cNvPr>
+          <p:cNvSpPr txBox="1">
+            <a:spLocks/>
+          </p:cNvSpPr>
+          <p:nvPr/>
+        </p:nvSpPr>
+        <p:spPr>
+          <a:xfrm>
+            <a:off x="848816" y="2156048"/>
+            <a:ext cx="7467600" cy="892696"/>
+          </a:xfrm>
+          <a:prstGeom prst="rect">
+            <a:avLst/>
+          </a:prstGeom>
+        </p:spPr>
+        <p:txBody>
+          <a:bodyPr vert="horz">
+            <a:normAutofit lnSpcReduction="10000"/>
+          </a:bodyPr>
+          <a:lstStyle>
+            <a:lvl1pPr marL="274320" indent="-274320" algn="l" rtl="0" eaLnBrk="1" latinLnBrk="0" hangingPunct="1">
+              <a:spcBef>
+                <a:spcPts val="600"/>
+              </a:spcBef>
+              <a:buClr>
+                <a:schemeClr val="accent1"/>
+              </a:buClr>
+              <a:buSzPct val="70000"/>
+              <a:buFont typeface="Wingdings"/>
+              <a:buChar char=""/>
+              <a:defRPr kumimoji="0" sz="2400" kern="1200">
+                <a:solidFill>
+                  <a:schemeClr val="tx1"/>
+                </a:solidFill>
+                <a:latin typeface="+mn-lt"/>
+                <a:ea typeface="+mn-ea"/>
+                <a:cs typeface="+mn-cs"/>
+              </a:defRPr>
+            </a:lvl1pPr>
+            <a:lvl2pPr marL="640080" indent="-274320" algn="l" rtl="0" eaLnBrk="1" latinLnBrk="0" hangingPunct="1">
+              <a:spcBef>
+                <a:spcPct val="20000"/>
+              </a:spcBef>
+              <a:buClr>
+                <a:schemeClr val="accent1"/>
+              </a:buClr>
+              <a:buSzPct val="80000"/>
+              <a:buFont typeface="Wingdings 2"/>
+              <a:buChar char=""/>
+              <a:defRPr kumimoji="0" sz="2100" kern="1200">
+                <a:solidFill>
+                  <a:schemeClr val="tx1"/>
+                </a:solidFill>
+                <a:latin typeface="+mn-lt"/>
+                <a:ea typeface="+mn-ea"/>
+                <a:cs typeface="+mn-cs"/>
+              </a:defRPr>
+            </a:lvl2pPr>
+            <a:lvl3pPr marL="914400" indent="-182880" algn="l" rtl="0" eaLnBrk="1" latinLnBrk="0" hangingPunct="1">
+              <a:spcBef>
+                <a:spcPct val="20000"/>
+              </a:spcBef>
+              <a:buClr>
+                <a:schemeClr val="accent1">
+                  <a:shade val="75000"/>
+                </a:schemeClr>
+              </a:buClr>
+              <a:buSzPct val="60000"/>
+              <a:buFont typeface="Wingdings"/>
+              <a:buChar char=""/>
+              <a:defRPr kumimoji="0" sz="1800" kern="1200">
+                <a:solidFill>
+                  <a:schemeClr val="tx1"/>
+                </a:solidFill>
+                <a:latin typeface="+mn-lt"/>
+                <a:ea typeface="+mn-ea"/>
+                <a:cs typeface="+mn-cs"/>
+              </a:defRPr>
+            </a:lvl3pPr>
+            <a:lvl4pPr marL="1188720" indent="-182880" algn="l" rtl="0" eaLnBrk="1" latinLnBrk="0" hangingPunct="1">
+              <a:spcBef>
+                <a:spcPct val="20000"/>
+              </a:spcBef>
+              <a:buClr>
+                <a:schemeClr val="accent1">
+                  <a:tint val="60000"/>
+                </a:schemeClr>
+              </a:buClr>
+              <a:buSzPct val="60000"/>
+              <a:buFont typeface="Wingdings"/>
+              <a:buChar char=""/>
+              <a:defRPr kumimoji="0" sz="1800" kern="1200">
+                <a:solidFill>
+                  <a:schemeClr val="tx1"/>
+                </a:solidFill>
+                <a:latin typeface="+mn-lt"/>
+                <a:ea typeface="+mn-ea"/>
+                <a:cs typeface="+mn-cs"/>
+              </a:defRPr>
+            </a:lvl4pPr>
+            <a:lvl5pPr marL="1463040" indent="-182880" algn="l" rtl="0" eaLnBrk="1" latinLnBrk="0" hangingPunct="1">
+              <a:spcBef>
+                <a:spcPct val="20000"/>
+              </a:spcBef>
+              <a:buClr>
+                <a:schemeClr val="accent2">
+                  <a:tint val="60000"/>
+                </a:schemeClr>
+              </a:buClr>
+              <a:buSzPct val="68000"/>
+              <a:buFont typeface="Wingdings 2"/>
+              <a:buChar char=""/>
+              <a:defRPr kumimoji="0" sz="1600" kern="1200">
+                <a:solidFill>
+                  <a:schemeClr val="tx1"/>
+                </a:solidFill>
+                <a:latin typeface="+mn-lt"/>
+                <a:ea typeface="+mn-ea"/>
+                <a:cs typeface="+mn-cs"/>
+              </a:defRPr>
+            </a:lvl5pPr>
+            <a:lvl6pPr marL="1737360" indent="-182880" algn="l" rtl="0" eaLnBrk="1" latinLnBrk="0" hangingPunct="1">
+              <a:spcBef>
+                <a:spcPct val="20000"/>
+              </a:spcBef>
+              <a:buClr>
+                <a:schemeClr val="accent1"/>
+              </a:buClr>
+              <a:buChar char="•"/>
+              <a:defRPr kumimoji="0" sz="1600" kern="1200">
+                <a:solidFill>
+                  <a:schemeClr val="tx2"/>
+                </a:solidFill>
+                <a:latin typeface="+mn-lt"/>
+                <a:ea typeface="+mn-ea"/>
+                <a:cs typeface="+mn-cs"/>
+              </a:defRPr>
+            </a:lvl6pPr>
+            <a:lvl7pPr marL="2011680" indent="-182880" algn="l" rtl="0" eaLnBrk="1" latinLnBrk="0" hangingPunct="1">
+              <a:spcBef>
+                <a:spcPct val="20000"/>
+              </a:spcBef>
+              <a:buClr>
+                <a:schemeClr val="accent1">
+                  <a:tint val="60000"/>
+                </a:schemeClr>
+              </a:buClr>
+              <a:buSzPct val="60000"/>
+              <a:buFont typeface="Wingdings"/>
+              <a:buChar char=""/>
+              <a:defRPr kumimoji="0" sz="1400" kern="1200" baseline="0">
+                <a:solidFill>
+                  <a:schemeClr val="tx2"/>
+                </a:solidFill>
+                <a:latin typeface="+mn-lt"/>
+                <a:ea typeface="+mn-ea"/>
+                <a:cs typeface="+mn-cs"/>
+              </a:defRPr>
+            </a:lvl7pPr>
+            <a:lvl8pPr marL="2286000" indent="-182880" algn="l" rtl="0" eaLnBrk="1" latinLnBrk="0" hangingPunct="1">
+              <a:spcBef>
+                <a:spcPct val="20000"/>
+              </a:spcBef>
+              <a:buClr>
+                <a:schemeClr val="accent2"/>
+              </a:buClr>
+              <a:buChar char="•"/>
+              <a:defRPr kumimoji="0" sz="1400" kern="1200" cap="small" baseline="0">
+                <a:solidFill>
+                  <a:schemeClr val="tx2"/>
+                </a:solidFill>
+                <a:latin typeface="+mn-lt"/>
+                <a:ea typeface="+mn-ea"/>
+                <a:cs typeface="+mn-cs"/>
+              </a:defRPr>
+            </a:lvl8pPr>
+            <a:lvl9pPr marL="2560320" indent="-182880" algn="l" rtl="0" eaLnBrk="1" latinLnBrk="0" hangingPunct="1">
+              <a:spcBef>
+                <a:spcPct val="20000"/>
+              </a:spcBef>
+              <a:buClr>
+                <a:schemeClr val="accent1">
+                  <a:shade val="75000"/>
+                </a:schemeClr>
+              </a:buClr>
+              <a:buChar char="•"/>
+              <a:defRPr kumimoji="0" sz="1400" kern="1200" baseline="0">
+                <a:solidFill>
+                  <a:schemeClr val="tx2"/>
+                </a:solidFill>
+                <a:latin typeface="+mn-lt"/>
+                <a:ea typeface="+mn-ea"/>
+                <a:cs typeface="+mn-cs"/>
+              </a:defRPr>
+            </a:lvl9pPr>
+          </a:lstStyle>
+          <a:p>
+            <a:r>
+              <a:rPr lang="en-US" dirty="0" err="1"/>
+              <a:t>Warga</a:t>
+            </a:r>
+            <a:endParaRPr lang="en-US" dirty="0"/>
+          </a:p>
+          <a:p>
+            <a:r>
+              <a:rPr lang="en-ID" dirty="0">
+                <a:hlinkClick r:id="rId5"/>
+              </a:rPr>
+              <a:t>http://localhost/DM_bantuan/</a:t>
+            </a:r>
+            <a:endParaRPr lang="en-US" dirty="0"/>
+          </a:p>
+        </p:txBody>
+      </p:sp>
+      <p:sp>
+        <p:nvSpPr>
+          <p:cNvPr id="7" name="Content Placeholder 2">
+            <a:extLst>
+              <a:ext uri="{FF2B5EF4-FFF2-40B4-BE49-F238E27FC236}">
+                <a16:creationId xmlns:a16="http://schemas.microsoft.com/office/drawing/2014/main" id="{0E7FC78E-F21B-40E8-BE65-C027AF697CD8}"/>
+              </a:ext>
+            </a:extLst>
+          </p:cNvPr>
+          <p:cNvSpPr txBox="1">
+            <a:spLocks/>
+          </p:cNvSpPr>
+          <p:nvPr/>
+        </p:nvSpPr>
+        <p:spPr>
+          <a:xfrm>
+            <a:off x="3644280" y="1471548"/>
+            <a:ext cx="1656184" cy="556697"/>
+          </a:xfrm>
+          <a:prstGeom prst="rect">
+            <a:avLst/>
+          </a:prstGeom>
+        </p:spPr>
+        <p:txBody>
+          <a:bodyPr vert="horz">
+            <a:normAutofit/>
+          </a:bodyPr>
+          <a:lstStyle>
+            <a:lvl1pPr marL="274320" indent="-274320" algn="l" rtl="0" eaLnBrk="1" latinLnBrk="0" hangingPunct="1">
+              <a:spcBef>
+                <a:spcPts val="600"/>
+              </a:spcBef>
+              <a:buClr>
+                <a:schemeClr val="accent1"/>
+              </a:buClr>
+              <a:buSzPct val="70000"/>
+              <a:buFont typeface="Wingdings"/>
+              <a:buChar char=""/>
+              <a:defRPr kumimoji="0" sz="2400" kern="1200">
+                <a:solidFill>
+                  <a:schemeClr val="tx1"/>
+                </a:solidFill>
+                <a:latin typeface="+mn-lt"/>
+                <a:ea typeface="+mn-ea"/>
+                <a:cs typeface="+mn-cs"/>
+              </a:defRPr>
+            </a:lvl1pPr>
+            <a:lvl2pPr marL="640080" indent="-274320" algn="l" rtl="0" eaLnBrk="1" latinLnBrk="0" hangingPunct="1">
+              <a:spcBef>
+                <a:spcPct val="20000"/>
+              </a:spcBef>
+              <a:buClr>
+                <a:schemeClr val="accent1"/>
+              </a:buClr>
+              <a:buSzPct val="80000"/>
+              <a:buFont typeface="Wingdings 2"/>
+              <a:buChar char=""/>
+              <a:defRPr kumimoji="0" sz="2100" kern="1200">
+                <a:solidFill>
+                  <a:schemeClr val="tx1"/>
+                </a:solidFill>
+                <a:latin typeface="+mn-lt"/>
+                <a:ea typeface="+mn-ea"/>
+                <a:cs typeface="+mn-cs"/>
+              </a:defRPr>
+            </a:lvl2pPr>
+            <a:lvl3pPr marL="914400" indent="-182880" algn="l" rtl="0" eaLnBrk="1" latinLnBrk="0" hangingPunct="1">
+              <a:spcBef>
+                <a:spcPct val="20000"/>
+              </a:spcBef>
+              <a:buClr>
+                <a:schemeClr val="accent1">
+                  <a:shade val="75000"/>
+                </a:schemeClr>
+              </a:buClr>
+              <a:buSzPct val="60000"/>
+              <a:buFont typeface="Wingdings"/>
+              <a:buChar char=""/>
+              <a:defRPr kumimoji="0" sz="1800" kern="1200">
+                <a:solidFill>
+                  <a:schemeClr val="tx1"/>
+                </a:solidFill>
+                <a:latin typeface="+mn-lt"/>
+                <a:ea typeface="+mn-ea"/>
+                <a:cs typeface="+mn-cs"/>
+              </a:defRPr>
+            </a:lvl3pPr>
+            <a:lvl4pPr marL="1188720" indent="-182880" algn="l" rtl="0" eaLnBrk="1" latinLnBrk="0" hangingPunct="1">
+              <a:spcBef>
+                <a:spcPct val="20000"/>
+              </a:spcBef>
+              <a:buClr>
+                <a:schemeClr val="accent1">
+                  <a:tint val="60000"/>
+                </a:schemeClr>
+              </a:buClr>
+              <a:buSzPct val="60000"/>
+              <a:buFont typeface="Wingdings"/>
+              <a:buChar char=""/>
+              <a:defRPr kumimoji="0" sz="1800" kern="1200">
+                <a:solidFill>
+                  <a:schemeClr val="tx1"/>
+                </a:solidFill>
+                <a:latin typeface="+mn-lt"/>
+                <a:ea typeface="+mn-ea"/>
+                <a:cs typeface="+mn-cs"/>
+              </a:defRPr>
+            </a:lvl4pPr>
+            <a:lvl5pPr marL="1463040" indent="-182880" algn="l" rtl="0" eaLnBrk="1" latinLnBrk="0" hangingPunct="1">
+              <a:spcBef>
+                <a:spcPct val="20000"/>
+              </a:spcBef>
+              <a:buClr>
+                <a:schemeClr val="accent2">
+                  <a:tint val="60000"/>
+                </a:schemeClr>
+              </a:buClr>
+              <a:buSzPct val="68000"/>
+              <a:buFont typeface="Wingdings 2"/>
+              <a:buChar char=""/>
+              <a:defRPr kumimoji="0" sz="1600" kern="1200">
+                <a:solidFill>
+                  <a:schemeClr val="tx1"/>
+                </a:solidFill>
+                <a:latin typeface="+mn-lt"/>
+                <a:ea typeface="+mn-ea"/>
+                <a:cs typeface="+mn-cs"/>
+              </a:defRPr>
+            </a:lvl5pPr>
+            <a:lvl6pPr marL="1737360" indent="-182880" algn="l" rtl="0" eaLnBrk="1" latinLnBrk="0" hangingPunct="1">
+              <a:spcBef>
+                <a:spcPct val="20000"/>
+              </a:spcBef>
+              <a:buClr>
+                <a:schemeClr val="accent1"/>
+              </a:buClr>
+              <a:buChar char="•"/>
+              <a:defRPr kumimoji="0" sz="1600" kern="1200">
+                <a:solidFill>
+                  <a:schemeClr val="tx2"/>
+                </a:solidFill>
+                <a:latin typeface="+mn-lt"/>
+                <a:ea typeface="+mn-ea"/>
+                <a:cs typeface="+mn-cs"/>
+              </a:defRPr>
+            </a:lvl6pPr>
+            <a:lvl7pPr marL="2011680" indent="-182880" algn="l" rtl="0" eaLnBrk="1" latinLnBrk="0" hangingPunct="1">
+              <a:spcBef>
+                <a:spcPct val="20000"/>
+              </a:spcBef>
+              <a:buClr>
+                <a:schemeClr val="accent1">
+                  <a:tint val="60000"/>
+                </a:schemeClr>
+              </a:buClr>
+              <a:buSzPct val="60000"/>
+              <a:buFont typeface="Wingdings"/>
+              <a:buChar char=""/>
+              <a:defRPr kumimoji="0" sz="1400" kern="1200" baseline="0">
+                <a:solidFill>
+                  <a:schemeClr val="tx2"/>
+                </a:solidFill>
+                <a:latin typeface="+mn-lt"/>
+                <a:ea typeface="+mn-ea"/>
+                <a:cs typeface="+mn-cs"/>
+              </a:defRPr>
+            </a:lvl7pPr>
+            <a:lvl8pPr marL="2286000" indent="-182880" algn="l" rtl="0" eaLnBrk="1" latinLnBrk="0" hangingPunct="1">
+              <a:spcBef>
+                <a:spcPct val="20000"/>
+              </a:spcBef>
+              <a:buClr>
+                <a:schemeClr val="accent2"/>
+              </a:buClr>
+              <a:buChar char="•"/>
+              <a:defRPr kumimoji="0" sz="1400" kern="1200" cap="small" baseline="0">
+                <a:solidFill>
+                  <a:schemeClr val="tx2"/>
+                </a:solidFill>
+                <a:latin typeface="+mn-lt"/>
+                <a:ea typeface="+mn-ea"/>
+                <a:cs typeface="+mn-cs"/>
+              </a:defRPr>
+            </a:lvl8pPr>
+            <a:lvl9pPr marL="2560320" indent="-182880" algn="l" rtl="0" eaLnBrk="1" latinLnBrk="0" hangingPunct="1">
+              <a:spcBef>
+                <a:spcPct val="20000"/>
+              </a:spcBef>
+              <a:buClr>
+                <a:schemeClr val="accent1">
+                  <a:shade val="75000"/>
+                </a:schemeClr>
+              </a:buClr>
+              <a:buChar char="•"/>
+              <a:defRPr kumimoji="0" sz="1400" kern="1200" baseline="0">
+                <a:solidFill>
+                  <a:schemeClr val="tx2"/>
+                </a:solidFill>
+                <a:latin typeface="+mn-lt"/>
+                <a:ea typeface="+mn-ea"/>
+                <a:cs typeface="+mn-cs"/>
+              </a:defRPr>
+            </a:lvl9pPr>
+          </a:lstStyle>
+          <a:p>
+            <a:pPr algn="ctr"/>
+            <a:r>
+              <a:rPr lang="en-US" dirty="0"/>
+              <a:t>Offline</a:t>
+            </a:r>
+          </a:p>
+        </p:txBody>
+      </p:sp>
+      <p:sp>
+        <p:nvSpPr>
+          <p:cNvPr id="8" name="Content Placeholder 2">
+            <a:extLst>
+              <a:ext uri="{FF2B5EF4-FFF2-40B4-BE49-F238E27FC236}">
+                <a16:creationId xmlns:a16="http://schemas.microsoft.com/office/drawing/2014/main" id="{5D61EBEA-17C7-444D-B2C6-F7867D9A3FA8}"/>
+              </a:ext>
+            </a:extLst>
+          </p:cNvPr>
+          <p:cNvSpPr txBox="1">
+            <a:spLocks/>
+          </p:cNvSpPr>
+          <p:nvPr/>
+        </p:nvSpPr>
+        <p:spPr>
+          <a:xfrm>
+            <a:off x="3644280" y="4277439"/>
+            <a:ext cx="1656184" cy="556697"/>
+          </a:xfrm>
+          <a:prstGeom prst="rect">
+            <a:avLst/>
+          </a:prstGeom>
+        </p:spPr>
+        <p:txBody>
+          <a:bodyPr vert="horz">
+            <a:normAutofit/>
+          </a:bodyPr>
+          <a:lstStyle>
+            <a:lvl1pPr marL="274320" indent="-274320" algn="l" rtl="0" eaLnBrk="1" latinLnBrk="0" hangingPunct="1">
+              <a:spcBef>
+                <a:spcPts val="600"/>
+              </a:spcBef>
+              <a:buClr>
+                <a:schemeClr val="accent1"/>
+              </a:buClr>
+              <a:buSzPct val="70000"/>
+              <a:buFont typeface="Wingdings"/>
+              <a:buChar char=""/>
+              <a:defRPr kumimoji="0" sz="2400" kern="1200">
+                <a:solidFill>
+                  <a:schemeClr val="tx1"/>
+                </a:solidFill>
+                <a:latin typeface="+mn-lt"/>
+                <a:ea typeface="+mn-ea"/>
+                <a:cs typeface="+mn-cs"/>
+              </a:defRPr>
+            </a:lvl1pPr>
+            <a:lvl2pPr marL="640080" indent="-274320" algn="l" rtl="0" eaLnBrk="1" latinLnBrk="0" hangingPunct="1">
+              <a:spcBef>
+                <a:spcPct val="20000"/>
+              </a:spcBef>
+              <a:buClr>
+                <a:schemeClr val="accent1"/>
+              </a:buClr>
+              <a:buSzPct val="80000"/>
+              <a:buFont typeface="Wingdings 2"/>
+              <a:buChar char=""/>
+              <a:defRPr kumimoji="0" sz="2100" kern="1200">
+                <a:solidFill>
+                  <a:schemeClr val="tx1"/>
+                </a:solidFill>
+                <a:latin typeface="+mn-lt"/>
+                <a:ea typeface="+mn-ea"/>
+                <a:cs typeface="+mn-cs"/>
+              </a:defRPr>
+            </a:lvl2pPr>
+            <a:lvl3pPr marL="914400" indent="-182880" algn="l" rtl="0" eaLnBrk="1" latinLnBrk="0" hangingPunct="1">
+              <a:spcBef>
+                <a:spcPct val="20000"/>
+              </a:spcBef>
+              <a:buClr>
+                <a:schemeClr val="accent1">
+                  <a:shade val="75000"/>
+                </a:schemeClr>
+              </a:buClr>
+              <a:buSzPct val="60000"/>
+              <a:buFont typeface="Wingdings"/>
+              <a:buChar char=""/>
+              <a:defRPr kumimoji="0" sz="1800" kern="1200">
+                <a:solidFill>
+                  <a:schemeClr val="tx1"/>
+                </a:solidFill>
+                <a:latin typeface="+mn-lt"/>
+                <a:ea typeface="+mn-ea"/>
+                <a:cs typeface="+mn-cs"/>
+              </a:defRPr>
+            </a:lvl3pPr>
+            <a:lvl4pPr marL="1188720" indent="-182880" algn="l" rtl="0" eaLnBrk="1" latinLnBrk="0" hangingPunct="1">
+              <a:spcBef>
+                <a:spcPct val="20000"/>
+              </a:spcBef>
+              <a:buClr>
+                <a:schemeClr val="accent1">
+                  <a:tint val="60000"/>
+                </a:schemeClr>
+              </a:buClr>
+              <a:buSzPct val="60000"/>
+              <a:buFont typeface="Wingdings"/>
+              <a:buChar char=""/>
+              <a:defRPr kumimoji="0" sz="1800" kern="1200">
+                <a:solidFill>
+                  <a:schemeClr val="tx1"/>
+                </a:solidFill>
+                <a:latin typeface="+mn-lt"/>
+                <a:ea typeface="+mn-ea"/>
+                <a:cs typeface="+mn-cs"/>
+              </a:defRPr>
+            </a:lvl4pPr>
+            <a:lvl5pPr marL="1463040" indent="-182880" algn="l" rtl="0" eaLnBrk="1" latinLnBrk="0" hangingPunct="1">
+              <a:spcBef>
+                <a:spcPct val="20000"/>
+              </a:spcBef>
+              <a:buClr>
+                <a:schemeClr val="accent2">
+                  <a:tint val="60000"/>
+                </a:schemeClr>
+              </a:buClr>
+              <a:buSzPct val="68000"/>
+              <a:buFont typeface="Wingdings 2"/>
+              <a:buChar char=""/>
+              <a:defRPr kumimoji="0" sz="1600" kern="1200">
+                <a:solidFill>
+                  <a:schemeClr val="tx1"/>
+                </a:solidFill>
+                <a:latin typeface="+mn-lt"/>
+                <a:ea typeface="+mn-ea"/>
+                <a:cs typeface="+mn-cs"/>
+              </a:defRPr>
+            </a:lvl5pPr>
+            <a:lvl6pPr marL="1737360" indent="-182880" algn="l" rtl="0" eaLnBrk="1" latinLnBrk="0" hangingPunct="1">
+              <a:spcBef>
+                <a:spcPct val="20000"/>
+              </a:spcBef>
+              <a:buClr>
+                <a:schemeClr val="accent1"/>
+              </a:buClr>
+              <a:buChar char="•"/>
+              <a:defRPr kumimoji="0" sz="1600" kern="1200">
+                <a:solidFill>
+                  <a:schemeClr val="tx2"/>
+                </a:solidFill>
+                <a:latin typeface="+mn-lt"/>
+                <a:ea typeface="+mn-ea"/>
+                <a:cs typeface="+mn-cs"/>
+              </a:defRPr>
+            </a:lvl6pPr>
+            <a:lvl7pPr marL="2011680" indent="-182880" algn="l" rtl="0" eaLnBrk="1" latinLnBrk="0" hangingPunct="1">
+              <a:spcBef>
+                <a:spcPct val="20000"/>
+              </a:spcBef>
+              <a:buClr>
+                <a:schemeClr val="accent1">
+                  <a:tint val="60000"/>
+                </a:schemeClr>
+              </a:buClr>
+              <a:buSzPct val="60000"/>
+              <a:buFont typeface="Wingdings"/>
+              <a:buChar char=""/>
+              <a:defRPr kumimoji="0" sz="1400" kern="1200" baseline="0">
+                <a:solidFill>
+                  <a:schemeClr val="tx2"/>
+                </a:solidFill>
+                <a:latin typeface="+mn-lt"/>
+                <a:ea typeface="+mn-ea"/>
+                <a:cs typeface="+mn-cs"/>
+              </a:defRPr>
+            </a:lvl7pPr>
+            <a:lvl8pPr marL="2286000" indent="-182880" algn="l" rtl="0" eaLnBrk="1" latinLnBrk="0" hangingPunct="1">
+              <a:spcBef>
+                <a:spcPct val="20000"/>
+              </a:spcBef>
+              <a:buClr>
+                <a:schemeClr val="accent2"/>
+              </a:buClr>
+              <a:buChar char="•"/>
+              <a:defRPr kumimoji="0" sz="1400" kern="1200" cap="small" baseline="0">
+                <a:solidFill>
+                  <a:schemeClr val="tx2"/>
+                </a:solidFill>
+                <a:latin typeface="+mn-lt"/>
+                <a:ea typeface="+mn-ea"/>
+                <a:cs typeface="+mn-cs"/>
+              </a:defRPr>
+            </a:lvl8pPr>
+            <a:lvl9pPr marL="2560320" indent="-182880" algn="l" rtl="0" eaLnBrk="1" latinLnBrk="0" hangingPunct="1">
+              <a:spcBef>
+                <a:spcPct val="20000"/>
+              </a:spcBef>
+              <a:buClr>
+                <a:schemeClr val="accent1">
+                  <a:shade val="75000"/>
+                </a:schemeClr>
+              </a:buClr>
+              <a:buChar char="•"/>
+              <a:defRPr kumimoji="0" sz="1400" kern="1200" baseline="0">
+                <a:solidFill>
+                  <a:schemeClr val="tx2"/>
+                </a:solidFill>
+                <a:latin typeface="+mn-lt"/>
+                <a:ea typeface="+mn-ea"/>
+                <a:cs typeface="+mn-cs"/>
+              </a:defRPr>
+            </a:lvl9pPr>
+          </a:lstStyle>
+          <a:p>
+            <a:pPr algn="ctr"/>
+            <a:r>
+              <a:rPr lang="en-US" dirty="0"/>
+              <a:t>Online</a:t>
+            </a:r>
+          </a:p>
+        </p:txBody>
+      </p:sp>
+      <p:sp>
+        <p:nvSpPr>
+          <p:cNvPr id="10" name="Content Placeholder 2">
+            <a:extLst>
+              <a:ext uri="{FF2B5EF4-FFF2-40B4-BE49-F238E27FC236}">
+                <a16:creationId xmlns:a16="http://schemas.microsoft.com/office/drawing/2014/main" id="{5BDB5030-B37E-4812-9070-A9FE114CA357}"/>
+              </a:ext>
+            </a:extLst>
+          </p:cNvPr>
+          <p:cNvSpPr txBox="1">
+            <a:spLocks/>
+          </p:cNvSpPr>
+          <p:nvPr/>
+        </p:nvSpPr>
+        <p:spPr>
+          <a:xfrm>
+            <a:off x="824270" y="5549552"/>
+            <a:ext cx="7467600" cy="892696"/>
+          </a:xfrm>
+          <a:prstGeom prst="rect">
+            <a:avLst/>
+          </a:prstGeom>
+        </p:spPr>
+        <p:txBody>
+          <a:bodyPr vert="horz">
+            <a:normAutofit lnSpcReduction="10000"/>
+          </a:bodyPr>
+          <a:lstStyle>
+            <a:lvl1pPr marL="274320" indent="-274320" algn="l" rtl="0" eaLnBrk="1" latinLnBrk="0" hangingPunct="1">
+              <a:spcBef>
+                <a:spcPts val="600"/>
+              </a:spcBef>
+              <a:buClr>
+                <a:schemeClr val="accent1"/>
+              </a:buClr>
+              <a:buSzPct val="70000"/>
+              <a:buFont typeface="Wingdings"/>
+              <a:buChar char=""/>
+              <a:defRPr kumimoji="0" sz="2400" kern="1200">
+                <a:solidFill>
+                  <a:schemeClr val="tx1"/>
+                </a:solidFill>
+                <a:latin typeface="+mn-lt"/>
+                <a:ea typeface="+mn-ea"/>
+                <a:cs typeface="+mn-cs"/>
+              </a:defRPr>
+            </a:lvl1pPr>
+            <a:lvl2pPr marL="640080" indent="-274320" algn="l" rtl="0" eaLnBrk="1" latinLnBrk="0" hangingPunct="1">
+              <a:spcBef>
+                <a:spcPct val="20000"/>
+              </a:spcBef>
+              <a:buClr>
+                <a:schemeClr val="accent1"/>
+              </a:buClr>
+              <a:buSzPct val="80000"/>
+              <a:buFont typeface="Wingdings 2"/>
+              <a:buChar char=""/>
+              <a:defRPr kumimoji="0" sz="2100" kern="1200">
+                <a:solidFill>
+                  <a:schemeClr val="tx1"/>
+                </a:solidFill>
+                <a:latin typeface="+mn-lt"/>
+                <a:ea typeface="+mn-ea"/>
+                <a:cs typeface="+mn-cs"/>
+              </a:defRPr>
+            </a:lvl2pPr>
+            <a:lvl3pPr marL="914400" indent="-182880" algn="l" rtl="0" eaLnBrk="1" latinLnBrk="0" hangingPunct="1">
+              <a:spcBef>
+                <a:spcPct val="20000"/>
+              </a:spcBef>
+              <a:buClr>
+                <a:schemeClr val="accent1">
+                  <a:shade val="75000"/>
+                </a:schemeClr>
+              </a:buClr>
+              <a:buSzPct val="60000"/>
+              <a:buFont typeface="Wingdings"/>
+              <a:buChar char=""/>
+              <a:defRPr kumimoji="0" sz="1800" kern="1200">
+                <a:solidFill>
+                  <a:schemeClr val="tx1"/>
+                </a:solidFill>
+                <a:latin typeface="+mn-lt"/>
+                <a:ea typeface="+mn-ea"/>
+                <a:cs typeface="+mn-cs"/>
+              </a:defRPr>
+            </a:lvl3pPr>
+            <a:lvl4pPr marL="1188720" indent="-182880" algn="l" rtl="0" eaLnBrk="1" latinLnBrk="0" hangingPunct="1">
+              <a:spcBef>
+                <a:spcPct val="20000"/>
+              </a:spcBef>
+              <a:buClr>
+                <a:schemeClr val="accent1">
+                  <a:tint val="60000"/>
+                </a:schemeClr>
+              </a:buClr>
+              <a:buSzPct val="60000"/>
+              <a:buFont typeface="Wingdings"/>
+              <a:buChar char=""/>
+              <a:defRPr kumimoji="0" sz="1800" kern="1200">
+                <a:solidFill>
+                  <a:schemeClr val="tx1"/>
+                </a:solidFill>
+                <a:latin typeface="+mn-lt"/>
+                <a:ea typeface="+mn-ea"/>
+                <a:cs typeface="+mn-cs"/>
+              </a:defRPr>
+            </a:lvl4pPr>
+            <a:lvl5pPr marL="1463040" indent="-182880" algn="l" rtl="0" eaLnBrk="1" latinLnBrk="0" hangingPunct="1">
+              <a:spcBef>
+                <a:spcPct val="20000"/>
+              </a:spcBef>
+              <a:buClr>
+                <a:schemeClr val="accent2">
+                  <a:tint val="60000"/>
+                </a:schemeClr>
+              </a:buClr>
+              <a:buSzPct val="68000"/>
+              <a:buFont typeface="Wingdings 2"/>
+              <a:buChar char=""/>
+              <a:defRPr kumimoji="0" sz="1600" kern="1200">
+                <a:solidFill>
+                  <a:schemeClr val="tx1"/>
+                </a:solidFill>
+                <a:latin typeface="+mn-lt"/>
+                <a:ea typeface="+mn-ea"/>
+                <a:cs typeface="+mn-cs"/>
+              </a:defRPr>
+            </a:lvl5pPr>
+            <a:lvl6pPr marL="1737360" indent="-182880" algn="l" rtl="0" eaLnBrk="1" latinLnBrk="0" hangingPunct="1">
+              <a:spcBef>
+                <a:spcPct val="20000"/>
+              </a:spcBef>
+              <a:buClr>
+                <a:schemeClr val="accent1"/>
+              </a:buClr>
+              <a:buChar char="•"/>
+              <a:defRPr kumimoji="0" sz="1600" kern="1200">
+                <a:solidFill>
+                  <a:schemeClr val="tx2"/>
+                </a:solidFill>
+                <a:latin typeface="+mn-lt"/>
+                <a:ea typeface="+mn-ea"/>
+                <a:cs typeface="+mn-cs"/>
+              </a:defRPr>
+            </a:lvl6pPr>
+            <a:lvl7pPr marL="2011680" indent="-182880" algn="l" rtl="0" eaLnBrk="1" latinLnBrk="0" hangingPunct="1">
+              <a:spcBef>
+                <a:spcPct val="20000"/>
+              </a:spcBef>
+              <a:buClr>
+                <a:schemeClr val="accent1">
+                  <a:tint val="60000"/>
+                </a:schemeClr>
+              </a:buClr>
+              <a:buSzPct val="60000"/>
+              <a:buFont typeface="Wingdings"/>
+              <a:buChar char=""/>
+              <a:defRPr kumimoji="0" sz="1400" kern="1200" baseline="0">
+                <a:solidFill>
+                  <a:schemeClr val="tx2"/>
+                </a:solidFill>
+                <a:latin typeface="+mn-lt"/>
+                <a:ea typeface="+mn-ea"/>
+                <a:cs typeface="+mn-cs"/>
+              </a:defRPr>
+            </a:lvl7pPr>
+            <a:lvl8pPr marL="2286000" indent="-182880" algn="l" rtl="0" eaLnBrk="1" latinLnBrk="0" hangingPunct="1">
+              <a:spcBef>
+                <a:spcPct val="20000"/>
+              </a:spcBef>
+              <a:buClr>
+                <a:schemeClr val="accent2"/>
+              </a:buClr>
+              <a:buChar char="•"/>
+              <a:defRPr kumimoji="0" sz="1400" kern="1200" cap="small" baseline="0">
+                <a:solidFill>
+                  <a:schemeClr val="tx2"/>
+                </a:solidFill>
+                <a:latin typeface="+mn-lt"/>
+                <a:ea typeface="+mn-ea"/>
+                <a:cs typeface="+mn-cs"/>
+              </a:defRPr>
+            </a:lvl8pPr>
+            <a:lvl9pPr marL="2560320" indent="-182880" algn="l" rtl="0" eaLnBrk="1" latinLnBrk="0" hangingPunct="1">
+              <a:spcBef>
+                <a:spcPct val="20000"/>
+              </a:spcBef>
+              <a:buClr>
+                <a:schemeClr val="accent1">
+                  <a:shade val="75000"/>
+                </a:schemeClr>
+              </a:buClr>
+              <a:buChar char="•"/>
+              <a:defRPr kumimoji="0" sz="1400" kern="1200" baseline="0">
+                <a:solidFill>
+                  <a:schemeClr val="tx2"/>
+                </a:solidFill>
+                <a:latin typeface="+mn-lt"/>
+                <a:ea typeface="+mn-ea"/>
+                <a:cs typeface="+mn-cs"/>
+              </a:defRPr>
+            </a:lvl9pPr>
+          </a:lstStyle>
+          <a:p>
+            <a:r>
+              <a:rPr lang="en-US" dirty="0" err="1"/>
+              <a:t>Warga</a:t>
+            </a:r>
+            <a:endParaRPr lang="en-US" dirty="0"/>
+          </a:p>
+          <a:p>
+            <a:r>
+              <a:rPr lang="en-ID">
+                <a:hlinkClick r:id="rId6"/>
+              </a:rPr>
+              <a:t>http://hutangcat.dx.am/</a:t>
             </a:r>
             <a:endParaRPr lang="en-US" dirty="0"/>
           </a:p>

</xml_diff>